<commit_message>
Final version of PyGotham presentation.
</commit_message>
<xml_diff>
--- a/docs/GenericProgrammingAndABM.pptx
+++ b/docs/GenericProgrammingAndABM.pptx
@@ -6,33 +6,34 @@
     <p:sldMasterId id="2147483674" r:id="rId5"/>
   </p:sldMasterIdLst>
   <p:notesMasterIdLst>
-    <p:notesMasterId r:id="rId30"/>
+    <p:notesMasterId r:id="rId31"/>
   </p:notesMasterIdLst>
   <p:sldIdLst>
     <p:sldId id="257" r:id="rId6"/>
     <p:sldId id="259" r:id="rId7"/>
-    <p:sldId id="266" r:id="rId8"/>
-    <p:sldId id="267" r:id="rId9"/>
-    <p:sldId id="269" r:id="rId10"/>
-    <p:sldId id="270" r:id="rId11"/>
-    <p:sldId id="271" r:id="rId12"/>
-    <p:sldId id="272" r:id="rId13"/>
-    <p:sldId id="273" r:id="rId14"/>
-    <p:sldId id="274" r:id="rId15"/>
-    <p:sldId id="275" r:id="rId16"/>
-    <p:sldId id="276" r:id="rId17"/>
-    <p:sldId id="280" r:id="rId18"/>
-    <p:sldId id="281" r:id="rId19"/>
-    <p:sldId id="277" r:id="rId20"/>
-    <p:sldId id="282" r:id="rId21"/>
-    <p:sldId id="283" r:id="rId22"/>
-    <p:sldId id="284" r:id="rId23"/>
-    <p:sldId id="285" r:id="rId24"/>
-    <p:sldId id="286" r:id="rId25"/>
-    <p:sldId id="268" r:id="rId26"/>
-    <p:sldId id="278" r:id="rId27"/>
-    <p:sldId id="279" r:id="rId28"/>
-    <p:sldId id="258" r:id="rId29"/>
+    <p:sldId id="289" r:id="rId8"/>
+    <p:sldId id="266" r:id="rId9"/>
+    <p:sldId id="267" r:id="rId10"/>
+    <p:sldId id="269" r:id="rId11"/>
+    <p:sldId id="270" r:id="rId12"/>
+    <p:sldId id="271" r:id="rId13"/>
+    <p:sldId id="272" r:id="rId14"/>
+    <p:sldId id="273" r:id="rId15"/>
+    <p:sldId id="274" r:id="rId16"/>
+    <p:sldId id="275" r:id="rId17"/>
+    <p:sldId id="276" r:id="rId18"/>
+    <p:sldId id="280" r:id="rId19"/>
+    <p:sldId id="281" r:id="rId20"/>
+    <p:sldId id="277" r:id="rId21"/>
+    <p:sldId id="287" r:id="rId22"/>
+    <p:sldId id="288" r:id="rId23"/>
+    <p:sldId id="282" r:id="rId24"/>
+    <p:sldId id="283" r:id="rId25"/>
+    <p:sldId id="284" r:id="rId26"/>
+    <p:sldId id="285" r:id="rId27"/>
+    <p:sldId id="286" r:id="rId28"/>
+    <p:sldId id="290" r:id="rId29"/>
+    <p:sldId id="268" r:id="rId30"/>
   </p:sldIdLst>
   <p:sldSz cx="9144000" cy="6858000" type="screen4x3"/>
   <p:notesSz cx="6858000" cy="9144000"/>
@@ -2587,24 +2588,24 @@
     </dgm:pt>
   </dgm:ptLst>
   <dgm:cxnLst>
-    <dgm:cxn modelId="{CCA996A1-318D-6A4E-9533-A889880CD802}" type="presOf" srcId="{12F8EC89-9055-B44A-8103-35A5BB780004}" destId="{F28CD827-FC40-8246-A2E4-C239FDC84363}" srcOrd="0" destOrd="0" presId="urn:microsoft.com/office/officeart/2005/8/layout/equation1"/>
-    <dgm:cxn modelId="{F1D9183F-6CC0-5C49-9506-C2A06D716479}" type="presOf" srcId="{237340D4-3905-E742-967B-2D399DDE7B9D}" destId="{144F6ED5-83E9-D349-A69D-DDB49626C033}" srcOrd="0" destOrd="0" presId="urn:microsoft.com/office/officeart/2005/8/layout/equation1"/>
+    <dgm:cxn modelId="{878AB7F6-3B07-2945-ACDD-7E6702E7C699}" type="presOf" srcId="{0D81BDE3-1AE1-FC4D-B7B7-56DB92939268}" destId="{971E74A1-0580-4041-A710-FD96FCC106BA}" srcOrd="0" destOrd="0" presId="urn:microsoft.com/office/officeart/2005/8/layout/equation1"/>
+    <dgm:cxn modelId="{76758B72-993B-4B4C-9E42-64DC9D23C06E}" type="presOf" srcId="{237340D4-3905-E742-967B-2D399DDE7B9D}" destId="{144F6ED5-83E9-D349-A69D-DDB49626C033}" srcOrd="0" destOrd="0" presId="urn:microsoft.com/office/officeart/2005/8/layout/equation1"/>
+    <dgm:cxn modelId="{5039E464-BF27-5B4B-ACE4-9E72C041D2A8}" type="presOf" srcId="{52581020-7890-3F44-A890-F28A5D7C48EE}" destId="{18946B4B-5698-EE42-BF7D-125F7E2EE693}" srcOrd="0" destOrd="0" presId="urn:microsoft.com/office/officeart/2005/8/layout/equation1"/>
     <dgm:cxn modelId="{C10A37B4-07A5-6B4B-9773-5433DD659C3E}" srcId="{12F8EC89-9055-B44A-8103-35A5BB780004}" destId="{B3D8F302-9F8D-C443-81F3-D402632C7C4E}" srcOrd="0" destOrd="0" parTransId="{543DBF88-A80C-9B4F-BE64-500F33EA36C5}" sibTransId="{52581020-7890-3F44-A890-F28A5D7C48EE}"/>
-    <dgm:cxn modelId="{470CD5AB-24CD-E64A-9138-9CC6F7D4BCBB}" type="presOf" srcId="{0D81BDE3-1AE1-FC4D-B7B7-56DB92939268}" destId="{971E74A1-0580-4041-A710-FD96FCC106BA}" srcOrd="0" destOrd="0" presId="urn:microsoft.com/office/officeart/2005/8/layout/equation1"/>
+    <dgm:cxn modelId="{021EEEB7-0A70-2D4E-914F-78C5270AD00A}" type="presOf" srcId="{AE93453B-BDEF-3F41-A688-9C1D0BDFC101}" destId="{6B50A6D9-45B4-3F46-BD8C-8FD4F037326E}" srcOrd="0" destOrd="0" presId="urn:microsoft.com/office/officeart/2005/8/layout/equation1"/>
     <dgm:cxn modelId="{4051E3A6-A983-B14A-8C65-AD145A7FCAC4}" srcId="{12F8EC89-9055-B44A-8103-35A5BB780004}" destId="{0D81BDE3-1AE1-FC4D-B7B7-56DB92939268}" srcOrd="1" destOrd="0" parTransId="{496194B7-CAF8-8049-B9DD-F70E01C11781}" sibTransId="{AE93453B-BDEF-3F41-A688-9C1D0BDFC101}"/>
-    <dgm:cxn modelId="{B5BC2AAF-45F7-4242-A2B4-41B71E7B0F80}" type="presOf" srcId="{AE93453B-BDEF-3F41-A688-9C1D0BDFC101}" destId="{6B50A6D9-45B4-3F46-BD8C-8FD4F037326E}" srcOrd="0" destOrd="0" presId="urn:microsoft.com/office/officeart/2005/8/layout/equation1"/>
+    <dgm:cxn modelId="{E9ABFA12-C9BA-BC44-885D-D2EC363EB86D}" type="presOf" srcId="{12F8EC89-9055-B44A-8103-35A5BB780004}" destId="{F28CD827-FC40-8246-A2E4-C239FDC84363}" srcOrd="0" destOrd="0" presId="urn:microsoft.com/office/officeart/2005/8/layout/equation1"/>
     <dgm:cxn modelId="{746AC977-2FBB-B944-A985-B2B7D6DFBFE8}" srcId="{12F8EC89-9055-B44A-8103-35A5BB780004}" destId="{237340D4-3905-E742-967B-2D399DDE7B9D}" srcOrd="2" destOrd="0" parTransId="{791E0C17-6D90-F945-A04E-4D5EE65E1E04}" sibTransId="{124FC874-D43D-3A4D-B133-A075A1BEA960}"/>
-    <dgm:cxn modelId="{D0F2FF4F-5E62-C149-96C6-B2A0B97B5C37}" type="presOf" srcId="{B3D8F302-9F8D-C443-81F3-D402632C7C4E}" destId="{E3D25776-1101-4745-922A-FD7D5802F9C5}" srcOrd="0" destOrd="0" presId="urn:microsoft.com/office/officeart/2005/8/layout/equation1"/>
-    <dgm:cxn modelId="{0729E7FA-A2CB-E749-894A-1A6E415E05BB}" type="presOf" srcId="{52581020-7890-3F44-A890-F28A5D7C48EE}" destId="{18946B4B-5698-EE42-BF7D-125F7E2EE693}" srcOrd="0" destOrd="0" presId="urn:microsoft.com/office/officeart/2005/8/layout/equation1"/>
-    <dgm:cxn modelId="{41F2851E-2BE3-DF4F-BA15-D77340503E87}" type="presParOf" srcId="{F28CD827-FC40-8246-A2E4-C239FDC84363}" destId="{E3D25776-1101-4745-922A-FD7D5802F9C5}" srcOrd="0" destOrd="0" presId="urn:microsoft.com/office/officeart/2005/8/layout/equation1"/>
-    <dgm:cxn modelId="{115690F5-2B6F-7643-9118-1926E79B092D}" type="presParOf" srcId="{F28CD827-FC40-8246-A2E4-C239FDC84363}" destId="{E593FEC8-BCEB-DE44-A14A-A83AD246DC36}" srcOrd="1" destOrd="0" presId="urn:microsoft.com/office/officeart/2005/8/layout/equation1"/>
-    <dgm:cxn modelId="{33AD2CC3-4540-3F4D-8D7E-0F1CC6EA346C}" type="presParOf" srcId="{F28CD827-FC40-8246-A2E4-C239FDC84363}" destId="{18946B4B-5698-EE42-BF7D-125F7E2EE693}" srcOrd="2" destOrd="0" presId="urn:microsoft.com/office/officeart/2005/8/layout/equation1"/>
-    <dgm:cxn modelId="{1D6A9235-C222-704C-A444-814C3E1CEB26}" type="presParOf" srcId="{F28CD827-FC40-8246-A2E4-C239FDC84363}" destId="{D57F461E-2841-0043-8022-AE7728F1D7C8}" srcOrd="3" destOrd="0" presId="urn:microsoft.com/office/officeart/2005/8/layout/equation1"/>
-    <dgm:cxn modelId="{50CAA0EC-A2C5-044A-9272-83157AFD3676}" type="presParOf" srcId="{F28CD827-FC40-8246-A2E4-C239FDC84363}" destId="{971E74A1-0580-4041-A710-FD96FCC106BA}" srcOrd="4" destOrd="0" presId="urn:microsoft.com/office/officeart/2005/8/layout/equation1"/>
-    <dgm:cxn modelId="{AA8BC50B-1A2F-AE42-8568-252900B23182}" type="presParOf" srcId="{F28CD827-FC40-8246-A2E4-C239FDC84363}" destId="{7280A87B-792D-AD4C-B3A0-0DA4C77CADC7}" srcOrd="5" destOrd="0" presId="urn:microsoft.com/office/officeart/2005/8/layout/equation1"/>
-    <dgm:cxn modelId="{FF2DC5CF-68FE-074D-AE2F-35E16FAB9385}" type="presParOf" srcId="{F28CD827-FC40-8246-A2E4-C239FDC84363}" destId="{6B50A6D9-45B4-3F46-BD8C-8FD4F037326E}" srcOrd="6" destOrd="0" presId="urn:microsoft.com/office/officeart/2005/8/layout/equation1"/>
-    <dgm:cxn modelId="{BB63B674-7540-4643-93EC-6EBFFCB76E1B}" type="presParOf" srcId="{F28CD827-FC40-8246-A2E4-C239FDC84363}" destId="{5FE3FEB3-1C39-C441-8F51-FBCAAB49843D}" srcOrd="7" destOrd="0" presId="urn:microsoft.com/office/officeart/2005/8/layout/equation1"/>
-    <dgm:cxn modelId="{936B7782-8B7E-3545-A2A7-B572B5BD2F45}" type="presParOf" srcId="{F28CD827-FC40-8246-A2E4-C239FDC84363}" destId="{144F6ED5-83E9-D349-A69D-DDB49626C033}" srcOrd="8" destOrd="0" presId="urn:microsoft.com/office/officeart/2005/8/layout/equation1"/>
+    <dgm:cxn modelId="{E2ACACD6-52C8-D54A-AF93-6BE2B890B497}" type="presOf" srcId="{B3D8F302-9F8D-C443-81F3-D402632C7C4E}" destId="{E3D25776-1101-4745-922A-FD7D5802F9C5}" srcOrd="0" destOrd="0" presId="urn:microsoft.com/office/officeart/2005/8/layout/equation1"/>
+    <dgm:cxn modelId="{317B769D-5C45-7D4D-99E3-FF688C4EAD59}" type="presParOf" srcId="{F28CD827-FC40-8246-A2E4-C239FDC84363}" destId="{E3D25776-1101-4745-922A-FD7D5802F9C5}" srcOrd="0" destOrd="0" presId="urn:microsoft.com/office/officeart/2005/8/layout/equation1"/>
+    <dgm:cxn modelId="{F7602FF9-9CA8-074F-911D-D38DD061136A}" type="presParOf" srcId="{F28CD827-FC40-8246-A2E4-C239FDC84363}" destId="{E593FEC8-BCEB-DE44-A14A-A83AD246DC36}" srcOrd="1" destOrd="0" presId="urn:microsoft.com/office/officeart/2005/8/layout/equation1"/>
+    <dgm:cxn modelId="{639DFC5A-3B37-0546-89FA-723C34B808D0}" type="presParOf" srcId="{F28CD827-FC40-8246-A2E4-C239FDC84363}" destId="{18946B4B-5698-EE42-BF7D-125F7E2EE693}" srcOrd="2" destOrd="0" presId="urn:microsoft.com/office/officeart/2005/8/layout/equation1"/>
+    <dgm:cxn modelId="{9E1C7127-4A06-D345-894C-C113C87DC5B8}" type="presParOf" srcId="{F28CD827-FC40-8246-A2E4-C239FDC84363}" destId="{D57F461E-2841-0043-8022-AE7728F1D7C8}" srcOrd="3" destOrd="0" presId="urn:microsoft.com/office/officeart/2005/8/layout/equation1"/>
+    <dgm:cxn modelId="{7C0692FD-0858-F747-8F23-3E511815A725}" type="presParOf" srcId="{F28CD827-FC40-8246-A2E4-C239FDC84363}" destId="{971E74A1-0580-4041-A710-FD96FCC106BA}" srcOrd="4" destOrd="0" presId="urn:microsoft.com/office/officeart/2005/8/layout/equation1"/>
+    <dgm:cxn modelId="{8EA47A2A-B202-CD42-832E-80E5C7A41E39}" type="presParOf" srcId="{F28CD827-FC40-8246-A2E4-C239FDC84363}" destId="{7280A87B-792D-AD4C-B3A0-0DA4C77CADC7}" srcOrd="5" destOrd="0" presId="urn:microsoft.com/office/officeart/2005/8/layout/equation1"/>
+    <dgm:cxn modelId="{B6A06CBA-D08A-DA47-AB91-98E79B3B3248}" type="presParOf" srcId="{F28CD827-FC40-8246-A2E4-C239FDC84363}" destId="{6B50A6D9-45B4-3F46-BD8C-8FD4F037326E}" srcOrd="6" destOrd="0" presId="urn:microsoft.com/office/officeart/2005/8/layout/equation1"/>
+    <dgm:cxn modelId="{CA222278-BFAB-A847-B9B6-92A9DD8C60F9}" type="presParOf" srcId="{F28CD827-FC40-8246-A2E4-C239FDC84363}" destId="{5FE3FEB3-1C39-C441-8F51-FBCAAB49843D}" srcOrd="7" destOrd="0" presId="urn:microsoft.com/office/officeart/2005/8/layout/equation1"/>
+    <dgm:cxn modelId="{D21DE83D-EA1A-9944-9CEF-4E0D2E530855}" type="presParOf" srcId="{F28CD827-FC40-8246-A2E4-C239FDC84363}" destId="{144F6ED5-83E9-D349-A69D-DDB49626C033}" srcOrd="8" destOrd="0" presId="urn:microsoft.com/office/officeart/2005/8/layout/equation1"/>
   </dgm:cxnLst>
   <dgm:bg/>
   <dgm:whole/>
@@ -9009,7 +9010,7 @@
             <a:fld id="{AB1CDEB6-C0D8-439D-94AA-7569540F08E4}" type="datetimeFigureOut">
               <a:rPr lang="en-US" smtClean="0"/>
               <a:pPr/>
-              <a:t>8/13/15</a:t>
+              <a:t>8/15/15</a:t>
             </a:fld>
             <a:endParaRPr lang="en-US"/>
           </a:p>
@@ -9367,7 +9368,7 @@
             <a:fld id="{81331B57-0BE5-4F82-AA58-76F53EFF3ADA}" type="datetime8">
               <a:rPr lang="en-US" smtClean="0"/>
               <a:pPr/>
-              <a:t>8/13/15 19:34</a:t>
+              <a:t>8/15/15 00:40</a:t>
             </a:fld>
             <a:endParaRPr lang="en-US" dirty="0"/>
           </a:p>
@@ -9456,364 +9457,6 @@
               <a:rPr lang="en-US" smtClean="0"/>
               <a:pPr/>
               <a:t>1</a:t>
-            </a:fld>
-            <a:endParaRPr lang="en-US" dirty="0"/>
-          </a:p>
-        </p:txBody>
-      </p:sp>
-    </p:spTree>
-  </p:cSld>
-  <p:clrMapOvr>
-    <a:masterClrMapping/>
-  </p:clrMapOvr>
-</p:notes>
-</file>
-
-<file path=ppt/notesSlides/notesSlide10.xml><?xml version="1.0" encoding="utf-8"?>
-<p:notes xmlns:a="http://schemas.openxmlformats.org/drawingml/2006/main" xmlns:r="http://schemas.openxmlformats.org/officeDocument/2006/relationships" xmlns:p="http://schemas.openxmlformats.org/presentationml/2006/main">
-  <p:cSld>
-    <p:spTree>
-      <p:nvGrpSpPr>
-        <p:cNvPr id="1" name=""/>
-        <p:cNvGrpSpPr/>
-        <p:nvPr/>
-      </p:nvGrpSpPr>
-      <p:grpSpPr>
-        <a:xfrm>
-          <a:off x="0" y="0"/>
-          <a:ext cx="0" cy="0"/>
-          <a:chOff x="0" y="0"/>
-          <a:chExt cx="0" cy="0"/>
-        </a:xfrm>
-      </p:grpSpPr>
-      <p:sp>
-        <p:nvSpPr>
-          <p:cNvPr id="2" name="Slide Image Placeholder 1"/>
-          <p:cNvSpPr>
-            <a:spLocks noGrp="1" noRot="1" noChangeAspect="1"/>
-          </p:cNvSpPr>
-          <p:nvPr>
-            <p:ph type="sldImg"/>
-          </p:nvPr>
-        </p:nvSpPr>
-        <p:spPr/>
-      </p:sp>
-      <p:sp>
-        <p:nvSpPr>
-          <p:cNvPr id="3" name="Notes Placeholder 2"/>
-          <p:cNvSpPr>
-            <a:spLocks noGrp="1"/>
-          </p:cNvSpPr>
-          <p:nvPr>
-            <p:ph type="body" idx="1"/>
-          </p:nvPr>
-        </p:nvSpPr>
-        <p:spPr/>
-        <p:txBody>
-          <a:bodyPr>
-            <a:normAutofit/>
-          </a:bodyPr>
-          <a:lstStyle/>
-          <a:p>
-            <a:endParaRPr lang="en-US"/>
-          </a:p>
-        </p:txBody>
-      </p:sp>
-      <p:sp>
-        <p:nvSpPr>
-          <p:cNvPr id="4" name="Header Placeholder 3"/>
-          <p:cNvSpPr>
-            <a:spLocks noGrp="1"/>
-          </p:cNvSpPr>
-          <p:nvPr>
-            <p:ph type="hdr" sz="quarter" idx="10"/>
-          </p:nvPr>
-        </p:nvSpPr>
-        <p:spPr/>
-        <p:txBody>
-          <a:bodyPr/>
-          <a:lstStyle/>
-          <a:p>
-            <a:endParaRPr lang="en-US" dirty="0"/>
-          </a:p>
-        </p:txBody>
-      </p:sp>
-      <p:sp>
-        <p:nvSpPr>
-          <p:cNvPr id="5" name="Date Placeholder 4"/>
-          <p:cNvSpPr>
-            <a:spLocks noGrp="1"/>
-          </p:cNvSpPr>
-          <p:nvPr>
-            <p:ph type="dt" idx="11"/>
-          </p:nvPr>
-        </p:nvSpPr>
-        <p:spPr/>
-        <p:txBody>
-          <a:bodyPr/>
-          <a:lstStyle/>
-          <a:p>
-            <a:fld id="{81331B57-0BE5-4F82-AA58-76F53EFF3ADA}" type="datetime8">
-              <a:rPr lang="en-US" smtClean="0"/>
-              <a:pPr/>
-              <a:t>8/13/15 19:35</a:t>
-            </a:fld>
-            <a:endParaRPr lang="en-US"/>
-          </a:p>
-        </p:txBody>
-      </p:sp>
-      <p:sp>
-        <p:nvSpPr>
-          <p:cNvPr id="6" name="Footer Placeholder 5"/>
-          <p:cNvSpPr>
-            <a:spLocks noGrp="1"/>
-          </p:cNvSpPr>
-          <p:nvPr>
-            <p:ph type="ftr" sz="quarter" idx="12"/>
-          </p:nvPr>
-        </p:nvSpPr>
-        <p:spPr/>
-        <p:txBody>
-          <a:bodyPr/>
-          <a:lstStyle/>
-          <a:p>
-            <a:r>
-              <a:rPr lang="en-US" smtClean="0">
-                <a:solidFill>
-                  <a:srgbClr val="000000"/>
-                </a:solidFill>
-              </a:rPr>
-              <a:t>© 2007 Microsoft Corporation. All rights reserved. Microsoft, Windows, Windows Vista and other product names are or may be registered trademarks and/or trademarks in the U.S. and/or other countries.</a:t>
-            </a:r>
-          </a:p>
-          <a:p>
-            <a:r>
-              <a:rPr lang="en-US" smtClean="0">
-                <a:solidFill>
-                  <a:srgbClr val="000000"/>
-                </a:solidFill>
-              </a:rPr>
-              <a:t>The information herein is for informational purposes only and represents the current view of Microsoft Corporation as of the date of this presentation.  Because Microsoft must respond to changing market conditions, it should not be interpreted to be a commitment on the part of Microsoft, and Microsoft cannot guarantee the accuracy of any information provided after the date of this presentation.  </a:t>
-            </a:r>
-            <a:br>
-              <a:rPr lang="en-US" smtClean="0">
-                <a:solidFill>
-                  <a:srgbClr val="000000"/>
-                </a:solidFill>
-              </a:rPr>
-            </a:br>
-            <a:r>
-              <a:rPr lang="en-US" smtClean="0">
-                <a:solidFill>
-                  <a:srgbClr val="000000"/>
-                </a:solidFill>
-              </a:rPr>
-              <a:t>MICROSOFT MAKES NO WARRANTIES, EXPRESS, IMPLIED OR STATUTORY, AS TO THE INFORMATION IN THIS PRESENTATION.</a:t>
-            </a:r>
-          </a:p>
-          <a:p>
-            <a:endParaRPr lang="en-US" dirty="0"/>
-          </a:p>
-        </p:txBody>
-      </p:sp>
-      <p:sp>
-        <p:nvSpPr>
-          <p:cNvPr id="7" name="Slide Number Placeholder 6"/>
-          <p:cNvSpPr>
-            <a:spLocks noGrp="1"/>
-          </p:cNvSpPr>
-          <p:nvPr>
-            <p:ph type="sldNum" sz="quarter" idx="13"/>
-          </p:nvPr>
-        </p:nvSpPr>
-        <p:spPr/>
-        <p:txBody>
-          <a:bodyPr/>
-          <a:lstStyle/>
-          <a:p>
-            <a:fld id="{EC87E0CF-87F6-4B58-B8B8-DCAB2DAAF3CA}" type="slidenum">
-              <a:rPr lang="en-US" smtClean="0"/>
-              <a:pPr/>
-              <a:t>23</a:t>
-            </a:fld>
-            <a:endParaRPr lang="en-US" dirty="0"/>
-          </a:p>
-        </p:txBody>
-      </p:sp>
-    </p:spTree>
-  </p:cSld>
-  <p:clrMapOvr>
-    <a:masterClrMapping/>
-  </p:clrMapOvr>
-</p:notes>
-</file>
-
-<file path=ppt/notesSlides/notesSlide11.xml><?xml version="1.0" encoding="utf-8"?>
-<p:notes xmlns:a="http://schemas.openxmlformats.org/drawingml/2006/main" xmlns:r="http://schemas.openxmlformats.org/officeDocument/2006/relationships" xmlns:p="http://schemas.openxmlformats.org/presentationml/2006/main">
-  <p:cSld>
-    <p:spTree>
-      <p:nvGrpSpPr>
-        <p:cNvPr id="1" name=""/>
-        <p:cNvGrpSpPr/>
-        <p:nvPr/>
-      </p:nvGrpSpPr>
-      <p:grpSpPr>
-        <a:xfrm>
-          <a:off x="0" y="0"/>
-          <a:ext cx="0" cy="0"/>
-          <a:chOff x="0" y="0"/>
-          <a:chExt cx="0" cy="0"/>
-        </a:xfrm>
-      </p:grpSpPr>
-      <p:sp>
-        <p:nvSpPr>
-          <p:cNvPr id="2" name="Slide Image Placeholder 1"/>
-          <p:cNvSpPr>
-            <a:spLocks noGrp="1" noRot="1" noChangeAspect="1"/>
-          </p:cNvSpPr>
-          <p:nvPr>
-            <p:ph type="sldImg"/>
-          </p:nvPr>
-        </p:nvSpPr>
-        <p:spPr/>
-      </p:sp>
-      <p:sp>
-        <p:nvSpPr>
-          <p:cNvPr id="3" name="Notes Placeholder 2"/>
-          <p:cNvSpPr>
-            <a:spLocks noGrp="1"/>
-          </p:cNvSpPr>
-          <p:nvPr>
-            <p:ph type="body" idx="1"/>
-          </p:nvPr>
-        </p:nvSpPr>
-        <p:spPr/>
-        <p:txBody>
-          <a:bodyPr>
-            <a:normAutofit/>
-          </a:bodyPr>
-          <a:lstStyle/>
-          <a:p>
-            <a:endParaRPr lang="en-US"/>
-          </a:p>
-        </p:txBody>
-      </p:sp>
-      <p:sp>
-        <p:nvSpPr>
-          <p:cNvPr id="4" name="Header Placeholder 3"/>
-          <p:cNvSpPr>
-            <a:spLocks noGrp="1"/>
-          </p:cNvSpPr>
-          <p:nvPr>
-            <p:ph type="hdr" sz="quarter" idx="10"/>
-          </p:nvPr>
-        </p:nvSpPr>
-        <p:spPr/>
-        <p:txBody>
-          <a:bodyPr/>
-          <a:lstStyle/>
-          <a:p>
-            <a:endParaRPr lang="en-US" dirty="0"/>
-          </a:p>
-        </p:txBody>
-      </p:sp>
-      <p:sp>
-        <p:nvSpPr>
-          <p:cNvPr id="5" name="Date Placeholder 4"/>
-          <p:cNvSpPr>
-            <a:spLocks noGrp="1"/>
-          </p:cNvSpPr>
-          <p:nvPr>
-            <p:ph type="dt" idx="11"/>
-          </p:nvPr>
-        </p:nvSpPr>
-        <p:spPr/>
-        <p:txBody>
-          <a:bodyPr/>
-          <a:lstStyle/>
-          <a:p>
-            <a:fld id="{81331B57-0BE5-4F82-AA58-76F53EFF3ADA}" type="datetime8">
-              <a:rPr lang="en-US" smtClean="0"/>
-              <a:pPr/>
-              <a:t>8/13/15 19:35</a:t>
-            </a:fld>
-            <a:endParaRPr lang="en-US"/>
-          </a:p>
-        </p:txBody>
-      </p:sp>
-      <p:sp>
-        <p:nvSpPr>
-          <p:cNvPr id="6" name="Footer Placeholder 5"/>
-          <p:cNvSpPr>
-            <a:spLocks noGrp="1"/>
-          </p:cNvSpPr>
-          <p:nvPr>
-            <p:ph type="ftr" sz="quarter" idx="12"/>
-          </p:nvPr>
-        </p:nvSpPr>
-        <p:spPr/>
-        <p:txBody>
-          <a:bodyPr/>
-          <a:lstStyle/>
-          <a:p>
-            <a:r>
-              <a:rPr lang="en-US" smtClean="0">
-                <a:solidFill>
-                  <a:srgbClr val="000000"/>
-                </a:solidFill>
-              </a:rPr>
-              <a:t>© 2007 Microsoft Corporation. All rights reserved. Microsoft, Windows, Windows Vista and other product names are or may be registered trademarks and/or trademarks in the U.S. and/or other countries.</a:t>
-            </a:r>
-          </a:p>
-          <a:p>
-            <a:r>
-              <a:rPr lang="en-US" smtClean="0">
-                <a:solidFill>
-                  <a:srgbClr val="000000"/>
-                </a:solidFill>
-              </a:rPr>
-              <a:t>The information herein is for informational purposes only and represents the current view of Microsoft Corporation as of the date of this presentation.  Because Microsoft must respond to changing market conditions, it should not be interpreted to be a commitment on the part of Microsoft, and Microsoft cannot guarantee the accuracy of any information provided after the date of this presentation.  </a:t>
-            </a:r>
-            <a:br>
-              <a:rPr lang="en-US" smtClean="0">
-                <a:solidFill>
-                  <a:srgbClr val="000000"/>
-                </a:solidFill>
-              </a:rPr>
-            </a:br>
-            <a:r>
-              <a:rPr lang="en-US" smtClean="0">
-                <a:solidFill>
-                  <a:srgbClr val="000000"/>
-                </a:solidFill>
-              </a:rPr>
-              <a:t>MICROSOFT MAKES NO WARRANTIES, EXPRESS, IMPLIED OR STATUTORY, AS TO THE INFORMATION IN THIS PRESENTATION.</a:t>
-            </a:r>
-          </a:p>
-          <a:p>
-            <a:endParaRPr lang="en-US" dirty="0"/>
-          </a:p>
-        </p:txBody>
-      </p:sp>
-      <p:sp>
-        <p:nvSpPr>
-          <p:cNvPr id="7" name="Slide Number Placeholder 6"/>
-          <p:cNvSpPr>
-            <a:spLocks noGrp="1"/>
-          </p:cNvSpPr>
-          <p:nvPr>
-            <p:ph type="sldNum" sz="quarter" idx="13"/>
-          </p:nvPr>
-        </p:nvSpPr>
-        <p:spPr/>
-        <p:txBody>
-          <a:bodyPr/>
-          <a:lstStyle/>
-          <a:p>
-            <a:fld id="{EC87E0CF-87F6-4B58-B8B8-DCAB2DAAF3CA}" type="slidenum">
-              <a:rPr lang="en-US" smtClean="0"/>
-              <a:pPr/>
-              <a:t>24</a:t>
             </a:fld>
             <a:endParaRPr lang="en-US" dirty="0"/>
           </a:p>
@@ -9914,7 +9557,7 @@
             <a:fld id="{81331B57-0BE5-4F82-AA58-76F53EFF3ADA}" type="datetime8">
               <a:rPr lang="en-US" smtClean="0"/>
               <a:pPr/>
-              <a:t>8/13/15 19:35</a:t>
+              <a:t>8/15/15 00:40</a:t>
             </a:fld>
             <a:endParaRPr lang="en-US"/>
           </a:p>
@@ -10093,7 +9736,7 @@
             <a:fld id="{81331B57-0BE5-4F82-AA58-76F53EFF3ADA}" type="datetime8">
               <a:rPr lang="en-US" smtClean="0"/>
               <a:pPr/>
-              <a:t>8/13/15 19:35</a:t>
+              <a:t>8/15/15 01:15</a:t>
             </a:fld>
             <a:endParaRPr lang="en-US"/>
           </a:p>
@@ -10272,7 +9915,7 @@
             <a:fld id="{81331B57-0BE5-4F82-AA58-76F53EFF3ADA}" type="datetime8">
               <a:rPr lang="en-US" smtClean="0"/>
               <a:pPr/>
-              <a:t>8/13/15 19:35</a:t>
+              <a:t>8/15/15 00:40</a:t>
             </a:fld>
             <a:endParaRPr lang="en-US"/>
           </a:p>
@@ -10451,7 +10094,7 @@
             <a:fld id="{81331B57-0BE5-4F82-AA58-76F53EFF3ADA}" type="datetime8">
               <a:rPr lang="en-US" smtClean="0"/>
               <a:pPr/>
-              <a:t>8/13/15 19:35</a:t>
+              <a:t>8/15/15 00:40</a:t>
             </a:fld>
             <a:endParaRPr lang="en-US"/>
           </a:p>
@@ -10630,7 +10273,7 @@
             <a:fld id="{81331B57-0BE5-4F82-AA58-76F53EFF3ADA}" type="datetime8">
               <a:rPr lang="en-US" smtClean="0"/>
               <a:pPr/>
-              <a:t>8/13/15 19:35</a:t>
+              <a:t>8/15/15 00:40</a:t>
             </a:fld>
             <a:endParaRPr lang="en-US"/>
           </a:p>
@@ -10809,7 +10452,7 @@
             <a:fld id="{81331B57-0BE5-4F82-AA58-76F53EFF3ADA}" type="datetime8">
               <a:rPr lang="en-US" smtClean="0"/>
               <a:pPr/>
-              <a:t>8/13/15 19:35</a:t>
+              <a:t>8/15/15 00:40</a:t>
             </a:fld>
             <a:endParaRPr lang="en-US"/>
           </a:p>
@@ -10988,7 +10631,7 @@
             <a:fld id="{81331B57-0BE5-4F82-AA58-76F53EFF3ADA}" type="datetime8">
               <a:rPr lang="en-US" smtClean="0"/>
               <a:pPr/>
-              <a:t>8/13/15 19:35</a:t>
+              <a:t>8/15/15 00:40</a:t>
             </a:fld>
             <a:endParaRPr lang="en-US"/>
           </a:p>
@@ -11066,7 +10709,7 @@
             <a:fld id="{EC87E0CF-87F6-4B58-B8B8-DCAB2DAAF3CA}" type="slidenum">
               <a:rPr lang="en-US" smtClean="0"/>
               <a:pPr/>
-              <a:t>21</a:t>
+              <a:t>8</a:t>
             </a:fld>
             <a:endParaRPr lang="en-US" dirty="0"/>
           </a:p>
@@ -11167,7 +10810,7 @@
             <a:fld id="{81331B57-0BE5-4F82-AA58-76F53EFF3ADA}" type="datetime8">
               <a:rPr lang="en-US" smtClean="0"/>
               <a:pPr/>
-              <a:t>8/13/15 19:35</a:t>
+              <a:t>8/15/15 01:45</a:t>
             </a:fld>
             <a:endParaRPr lang="en-US"/>
           </a:p>
@@ -11245,7 +10888,7 @@
             <a:fld id="{EC87E0CF-87F6-4B58-B8B8-DCAB2DAAF3CA}" type="slidenum">
               <a:rPr lang="en-US" smtClean="0"/>
               <a:pPr/>
-              <a:t>22</a:t>
+              <a:t>25</a:t>
             </a:fld>
             <a:endParaRPr lang="en-US" dirty="0"/>
           </a:p>
@@ -14560,7 +14203,7 @@
         <p:spPr>
           <a:xfrm>
             <a:off x="381000" y="1411552"/>
-            <a:ext cx="8382000" cy="4849532"/>
+            <a:ext cx="8382000" cy="4836848"/>
           </a:xfrm>
         </p:spPr>
         <p:txBody>
@@ -14569,182 +14212,57 @@
           <a:p>
             <a:r>
               <a:rPr lang="en-US" dirty="0" smtClean="0"/>
-              <a:t>Grid views implementation example:</a:t>
-            </a:r>
-          </a:p>
-          <a:p>
-            <a:r>
-              <a:rPr lang="en-US" sz="2000" dirty="0" err="1"/>
-              <a:t>def</a:t>
-            </a:r>
-            <a:r>
-              <a:rPr lang="en-US" sz="2000" dirty="0"/>
-              <a:t> </a:t>
-            </a:r>
-            <a:r>
-              <a:rPr lang="en-US" sz="2000" dirty="0" err="1"/>
-              <a:t>find_empty</a:t>
-            </a:r>
-            <a:r>
-              <a:rPr lang="en-US" sz="2000" dirty="0"/>
-              <a:t>(self, </a:t>
-            </a:r>
-            <a:r>
-              <a:rPr lang="en-US" sz="2000" dirty="0" err="1"/>
-              <a:t>grid_view</a:t>
-            </a:r>
-            <a:r>
-              <a:rPr lang="en-US" sz="2000" dirty="0"/>
-              <a:t>=None):                                             </a:t>
-            </a:r>
-          </a:p>
-          <a:p>
-            <a:r>
-              <a:rPr lang="en-US" sz="2000" dirty="0"/>
-              <a:t>    """                                                                          </a:t>
-            </a:r>
-          </a:p>
-          <a:p>
-            <a:r>
-              <a:rPr lang="en-US" sz="2000" dirty="0"/>
-              <a:t>    Return a random, empty cell.                                                 </a:t>
-            </a:r>
-          </a:p>
-          <a:p>
-            <a:r>
-              <a:rPr lang="en-US" sz="2000" dirty="0"/>
-              <a:t>    """                                                                           </a:t>
-            </a:r>
-          </a:p>
-          <a:p>
-            <a:r>
-              <a:rPr lang="en-US" sz="2000" dirty="0"/>
-              <a:t>    if </a:t>
-            </a:r>
-            <a:r>
-              <a:rPr lang="en-US" sz="2000" dirty="0" err="1"/>
-              <a:t>self.exists_empty_cells</a:t>
-            </a:r>
-            <a:r>
-              <a:rPr lang="en-US" sz="2000" dirty="0"/>
-              <a:t>():                                                 </a:t>
-            </a:r>
-          </a:p>
-          <a:p>
-            <a:r>
-              <a:rPr lang="en-US" sz="2000" dirty="0"/>
-              <a:t>        if </a:t>
-            </a:r>
-            <a:r>
-              <a:rPr lang="en-US" sz="2000" dirty="0" err="1"/>
-              <a:t>grid_view</a:t>
-            </a:r>
-            <a:r>
-              <a:rPr lang="en-US" sz="2000" dirty="0"/>
-              <a:t> is None:                                                     </a:t>
-            </a:r>
-          </a:p>
-          <a:p>
-            <a:r>
-              <a:rPr lang="en-US" sz="2000" dirty="0"/>
-              <a:t>            return </a:t>
-            </a:r>
-            <a:r>
-              <a:rPr lang="en-US" sz="2000" dirty="0" err="1"/>
-              <a:t>random.choice</a:t>
-            </a:r>
-            <a:r>
-              <a:rPr lang="en-US" sz="2000" dirty="0"/>
-              <a:t>(</a:t>
-            </a:r>
-            <a:r>
-              <a:rPr lang="en-US" sz="2000" dirty="0" err="1"/>
-              <a:t>self.empties</a:t>
-            </a:r>
-            <a:r>
-              <a:rPr lang="en-US" sz="2000" dirty="0"/>
-              <a:t>)                                    </a:t>
-            </a:r>
-          </a:p>
-          <a:p>
-            <a:r>
-              <a:rPr lang="en-US" sz="2000" dirty="0"/>
-              <a:t>        else:                                                                     </a:t>
-            </a:r>
-          </a:p>
-          <a:p>
-            <a:r>
-              <a:rPr lang="en-US" sz="2000" dirty="0"/>
-              <a:t>            </a:t>
-            </a:r>
-            <a:r>
-              <a:rPr lang="en-US" sz="2000" dirty="0" err="1"/>
-              <a:t>view_empties</a:t>
-            </a:r>
-            <a:r>
-              <a:rPr lang="en-US" sz="2000" dirty="0"/>
-              <a:t> = </a:t>
-            </a:r>
-            <a:r>
-              <a:rPr lang="en-US" sz="2000" dirty="0" err="1"/>
-              <a:t>grid_view.get_empties</a:t>
-            </a:r>
-            <a:r>
-              <a:rPr lang="en-US" sz="2000" dirty="0"/>
-              <a:t>()                                </a:t>
-            </a:r>
-          </a:p>
-          <a:p>
-            <a:r>
-              <a:rPr lang="en-US" sz="2000" dirty="0"/>
-              <a:t>            if </a:t>
-            </a:r>
-            <a:r>
-              <a:rPr lang="en-US" sz="2000" dirty="0" err="1"/>
-              <a:t>view_empties</a:t>
-            </a:r>
-            <a:r>
-              <a:rPr lang="en-US" sz="2000" dirty="0"/>
-              <a:t>:                                                      </a:t>
-            </a:r>
-          </a:p>
-          <a:p>
-            <a:r>
-              <a:rPr lang="en-US" sz="2000" dirty="0"/>
-              <a:t>                return </a:t>
-            </a:r>
-            <a:r>
-              <a:rPr lang="en-US" sz="2000" dirty="0" err="1"/>
-              <a:t>random.choice</a:t>
-            </a:r>
-            <a:r>
-              <a:rPr lang="en-US" sz="2000" dirty="0"/>
-              <a:t>(</a:t>
-            </a:r>
-            <a:r>
-              <a:rPr lang="en-US" sz="2000" dirty="0" err="1"/>
-              <a:t>view_empties</a:t>
-            </a:r>
-            <a:r>
-              <a:rPr lang="en-US" sz="2000" dirty="0"/>
-              <a:t>)                                </a:t>
-            </a:r>
-          </a:p>
-          <a:p>
-            <a:r>
-              <a:rPr lang="en-US" sz="2000" dirty="0"/>
-              <a:t>    return None                                                                   </a:t>
-            </a:r>
-          </a:p>
-          <a:p>
-            <a:endParaRPr lang="en-US" sz="2000" dirty="0"/>
+              <a:t>Space is usually represented as a grid.</a:t>
+            </a:r>
+          </a:p>
+          <a:p>
+            <a:pPr lvl="1"/>
+            <a:r>
+              <a:rPr lang="en-US" dirty="0" smtClean="0"/>
+              <a:t>For finer-grained space, add more cells!</a:t>
+            </a:r>
+          </a:p>
+          <a:p>
+            <a:r>
+              <a:rPr lang="en-US" dirty="0" smtClean="0"/>
+              <a:t>Many models have agents look at a “neighborhood” around their location, often a square.</a:t>
+            </a:r>
+          </a:p>
+          <a:p>
+            <a:pPr lvl="1"/>
+            <a:r>
+              <a:rPr lang="en-US" dirty="0" smtClean="0"/>
+              <a:t>Special methods are written to deal with this neighborhood.</a:t>
+            </a:r>
+          </a:p>
+          <a:p>
+            <a:r>
+              <a:rPr lang="en-US" dirty="0" smtClean="0"/>
+              <a:t>A powerful abstraction is the “grid view.” This can be </a:t>
+            </a:r>
+            <a:r>
+              <a:rPr lang="en-US" i="1" dirty="0" smtClean="0"/>
+              <a:t>any</a:t>
+            </a:r>
+            <a:r>
+              <a:rPr lang="en-US" dirty="0" smtClean="0"/>
+              <a:t> collection of cells around an agent.</a:t>
+            </a:r>
+          </a:p>
+          <a:p>
+            <a:pPr lvl="1"/>
+            <a:r>
+              <a:rPr lang="en-US" dirty="0" smtClean="0"/>
+              <a:t>All grid methods work on grid views.</a:t>
+            </a:r>
+            <a:endParaRPr lang="en-US" dirty="0"/>
           </a:p>
         </p:txBody>
       </p:sp>
     </p:spTree>
     <p:extLst>
       <p:ext uri="{BB962C8B-B14F-4D97-AF65-F5344CB8AC3E}">
-        <p14:creationId xmlns:p14="http://schemas.microsoft.com/office/powerpoint/2010/main" val="4259044637"/>
+        <p14:creationId xmlns:p14="http://schemas.microsoft.com/office/powerpoint/2010/main" val="2985670801"/>
       </p:ext>
     </p:extLst>
   </p:cSld>
@@ -14822,7 +14340,7 @@
         <p:spPr>
           <a:xfrm>
             <a:off x="381000" y="1411552"/>
-            <a:ext cx="8382000" cy="3897477"/>
+            <a:ext cx="8382000" cy="4849532"/>
           </a:xfrm>
         </p:spPr>
         <p:txBody>
@@ -14831,69 +14349,175 @@
           <a:p>
             <a:r>
               <a:rPr lang="en-US" dirty="0" smtClean="0"/>
-              <a:t>Agent loops.</a:t>
-            </a:r>
-          </a:p>
-          <a:p>
-            <a:pPr lvl="1"/>
-            <a:r>
-              <a:rPr lang="en-US" dirty="0" smtClean="0"/>
-              <a:t>All models have an </a:t>
-            </a:r>
-            <a:r>
-              <a:rPr lang="en-US" dirty="0" err="1" smtClean="0"/>
-              <a:t>act_loop</a:t>
-            </a:r>
-            <a:r>
-              <a:rPr lang="en-US" dirty="0" smtClean="0"/>
-              <a:t>.</a:t>
-            </a:r>
-          </a:p>
-          <a:p>
-            <a:pPr lvl="1"/>
-            <a:r>
-              <a:rPr lang="en-US" dirty="0" smtClean="0"/>
-              <a:t>Optionally, any model can have a </a:t>
-            </a:r>
-            <a:r>
-              <a:rPr lang="en-US" dirty="0" err="1" smtClean="0"/>
-              <a:t>preact_loop</a:t>
-            </a:r>
-            <a:r>
-              <a:rPr lang="en-US" dirty="0" smtClean="0"/>
-              <a:t> and/or a </a:t>
-            </a:r>
-            <a:r>
-              <a:rPr lang="en-US" dirty="0" err="1" smtClean="0"/>
-              <a:t>postact_loop</a:t>
-            </a:r>
-            <a:r>
-              <a:rPr lang="en-US" dirty="0" smtClean="0"/>
-              <a:t>. These are useful for setting up for acting or </a:t>
-            </a:r>
-            <a:r>
-              <a:rPr lang="en-US" dirty="0" err="1" smtClean="0"/>
-              <a:t>clean-up</a:t>
-            </a:r>
-            <a:r>
-              <a:rPr lang="en-US" dirty="0" smtClean="0"/>
-              <a:t> afterwards.</a:t>
-            </a:r>
-          </a:p>
-          <a:p>
-            <a:pPr lvl="1"/>
-            <a:r>
-              <a:rPr lang="en-US" dirty="0" smtClean="0"/>
-              <a:t>Example: setting state in forest fire model.</a:t>
-            </a:r>
-          </a:p>
-          <a:p>
-            <a:pPr lvl="1"/>
-            <a:r>
-              <a:rPr lang="en-US" dirty="0" smtClean="0"/>
-              <a:t>Rather than having to write these in each model that needs them, they are turned on by flags and performed in the base environment.</a:t>
-            </a:r>
-            <a:endParaRPr lang="en-US" dirty="0"/>
+              <a:t>Grid views implementation example:</a:t>
+            </a:r>
+          </a:p>
+          <a:p>
+            <a:r>
+              <a:rPr lang="en-US" sz="2000" dirty="0" err="1"/>
+              <a:t>def</a:t>
+            </a:r>
+            <a:r>
+              <a:rPr lang="en-US" sz="2000" dirty="0"/>
+              <a:t> </a:t>
+            </a:r>
+            <a:r>
+              <a:rPr lang="en-US" sz="2000" dirty="0" err="1"/>
+              <a:t>find_empty</a:t>
+            </a:r>
+            <a:r>
+              <a:rPr lang="en-US" sz="2000" dirty="0"/>
+              <a:t>(self, </a:t>
+            </a:r>
+            <a:r>
+              <a:rPr lang="en-US" sz="2000" dirty="0" err="1"/>
+              <a:t>grid_view</a:t>
+            </a:r>
+            <a:r>
+              <a:rPr lang="en-US" sz="2000" dirty="0"/>
+              <a:t>=None):                                             </a:t>
+            </a:r>
+          </a:p>
+          <a:p>
+            <a:r>
+              <a:rPr lang="en-US" sz="2000" dirty="0"/>
+              <a:t>    """                                                                          </a:t>
+            </a:r>
+          </a:p>
+          <a:p>
+            <a:r>
+              <a:rPr lang="en-US" sz="2000" dirty="0"/>
+              <a:t>    Return a random, empty cell.                                                 </a:t>
+            </a:r>
+          </a:p>
+          <a:p>
+            <a:r>
+              <a:rPr lang="en-US" sz="2000" dirty="0"/>
+              <a:t>    """                                                                           </a:t>
+            </a:r>
+          </a:p>
+          <a:p>
+            <a:r>
+              <a:rPr lang="en-US" sz="2000" dirty="0"/>
+              <a:t>    if </a:t>
+            </a:r>
+            <a:r>
+              <a:rPr lang="en-US" sz="2000" dirty="0" err="1"/>
+              <a:t>self.exists_empty_cells</a:t>
+            </a:r>
+            <a:r>
+              <a:rPr lang="en-US" sz="2000" dirty="0"/>
+              <a:t>():                                                 </a:t>
+            </a:r>
+          </a:p>
+          <a:p>
+            <a:r>
+              <a:rPr lang="en-US" sz="2000" dirty="0"/>
+              <a:t>        if </a:t>
+            </a:r>
+            <a:r>
+              <a:rPr lang="en-US" sz="2000" dirty="0" err="1"/>
+              <a:t>grid_view</a:t>
+            </a:r>
+            <a:r>
+              <a:rPr lang="en-US" sz="2000" dirty="0"/>
+              <a:t> is None:                                                     </a:t>
+            </a:r>
+          </a:p>
+          <a:p>
+            <a:r>
+              <a:rPr lang="en-US" sz="2000" dirty="0"/>
+              <a:t>            return </a:t>
+            </a:r>
+            <a:r>
+              <a:rPr lang="en-US" sz="2000" dirty="0" err="1"/>
+              <a:t>random.choice</a:t>
+            </a:r>
+            <a:r>
+              <a:rPr lang="en-US" sz="2000" dirty="0"/>
+              <a:t>(</a:t>
+            </a:r>
+            <a:r>
+              <a:rPr lang="en-US" sz="2000" dirty="0" err="1"/>
+              <a:t>self.empties</a:t>
+            </a:r>
+            <a:r>
+              <a:rPr lang="en-US" sz="2000" dirty="0"/>
+              <a:t>)                                    </a:t>
+            </a:r>
+          </a:p>
+          <a:p>
+            <a:r>
+              <a:rPr lang="en-US" sz="2000" dirty="0"/>
+              <a:t>        else:                                                                     </a:t>
+            </a:r>
+          </a:p>
+          <a:p>
+            <a:r>
+              <a:rPr lang="en-US" sz="2000" dirty="0"/>
+              <a:t>            </a:t>
+            </a:r>
+            <a:r>
+              <a:rPr lang="en-US" sz="2000" dirty="0" err="1"/>
+              <a:t>view_empties</a:t>
+            </a:r>
+            <a:r>
+              <a:rPr lang="en-US" sz="2000" dirty="0"/>
+              <a:t> = </a:t>
+            </a:r>
+            <a:r>
+              <a:rPr lang="en-US" sz="2000" dirty="0" err="1"/>
+              <a:t>grid_view.get_empties</a:t>
+            </a:r>
+            <a:r>
+              <a:rPr lang="en-US" sz="2000" dirty="0"/>
+              <a:t>()                                </a:t>
+            </a:r>
+          </a:p>
+          <a:p>
+            <a:r>
+              <a:rPr lang="en-US" sz="2000" dirty="0"/>
+              <a:t>            if </a:t>
+            </a:r>
+            <a:r>
+              <a:rPr lang="en-US" sz="2000" dirty="0" err="1"/>
+              <a:t>view_empties</a:t>
+            </a:r>
+            <a:r>
+              <a:rPr lang="en-US" sz="2000" dirty="0"/>
+              <a:t>:                                                      </a:t>
+            </a:r>
+          </a:p>
+          <a:p>
+            <a:r>
+              <a:rPr lang="en-US" sz="2000" dirty="0"/>
+              <a:t>                return </a:t>
+            </a:r>
+            <a:r>
+              <a:rPr lang="en-US" sz="2000" dirty="0" err="1"/>
+              <a:t>random.choice</a:t>
+            </a:r>
+            <a:r>
+              <a:rPr lang="en-US" sz="2000" dirty="0"/>
+              <a:t>(</a:t>
+            </a:r>
+            <a:r>
+              <a:rPr lang="en-US" sz="2000" dirty="0" err="1"/>
+              <a:t>view_empties</a:t>
+            </a:r>
+            <a:r>
+              <a:rPr lang="en-US" sz="2000" dirty="0"/>
+              <a:t>)                                </a:t>
+            </a:r>
+          </a:p>
+          <a:p>
+            <a:r>
+              <a:rPr lang="en-US" sz="2000" dirty="0"/>
+              <a:t>    return None                                                                   </a:t>
+            </a:r>
+          </a:p>
+          <a:p>
+            <a:endParaRPr lang="en-US" sz="2000" dirty="0"/>
           </a:p>
         </p:txBody>
       </p:sp>
@@ -14977,8 +14601,8 @@
         </p:nvSpPr>
         <p:spPr>
           <a:xfrm>
-            <a:off x="152400" y="1066800"/>
-            <a:ext cx="8915400" cy="2362200"/>
+            <a:off x="381000" y="1411552"/>
+            <a:ext cx="8382000" cy="3897477"/>
           </a:xfrm>
         </p:spPr>
         <p:txBody>
@@ -14986,63 +14610,73 @@
           <a:lstStyle/>
           <a:p>
             <a:r>
-              <a:rPr lang="en-US" sz="2800" dirty="0" smtClean="0"/>
-              <a:t>Abstracting common patterns from models.</a:t>
+              <a:rPr lang="en-US" dirty="0" smtClean="0"/>
+              <a:t>Agent loops.</a:t>
             </a:r>
           </a:p>
           <a:p>
             <a:pPr lvl="1"/>
             <a:r>
-              <a:rPr lang="en-US" sz="2400" dirty="0" smtClean="0"/>
-              <a:t>Begin with a fashion model, with trend-setters and followers.</a:t>
+              <a:rPr lang="en-US" dirty="0" smtClean="0"/>
+              <a:t>All models have an </a:t>
+            </a:r>
+            <a:r>
+              <a:rPr lang="en-US" dirty="0" err="1" smtClean="0"/>
+              <a:t>act_loop</a:t>
+            </a:r>
+            <a:r>
+              <a:rPr lang="en-US" dirty="0" smtClean="0"/>
+              <a:t>.</a:t>
             </a:r>
           </a:p>
           <a:p>
             <a:pPr lvl="1"/>
             <a:r>
-              <a:rPr lang="en-US" sz="2400" dirty="0" smtClean="0"/>
-              <a:t>Add a model of asset traders, with value investors and chart followers.</a:t>
+              <a:rPr lang="en-US" dirty="0" smtClean="0"/>
+              <a:t>Optionally, any model can have a </a:t>
+            </a:r>
+            <a:r>
+              <a:rPr lang="en-US" dirty="0" err="1" smtClean="0"/>
+              <a:t>preact_loop</a:t>
+            </a:r>
+            <a:r>
+              <a:rPr lang="en-US" dirty="0" smtClean="0"/>
+              <a:t> and/or a </a:t>
+            </a:r>
+            <a:r>
+              <a:rPr lang="en-US" dirty="0" err="1" smtClean="0"/>
+              <a:t>postact_loop</a:t>
+            </a:r>
+            <a:r>
+              <a:rPr lang="en-US" dirty="0" smtClean="0"/>
+              <a:t>. These are useful for setting up for acting or </a:t>
+            </a:r>
+            <a:r>
+              <a:rPr lang="en-US" dirty="0" err="1" smtClean="0"/>
+              <a:t>clean-up</a:t>
+            </a:r>
+            <a:r>
+              <a:rPr lang="en-US" dirty="0" smtClean="0"/>
+              <a:t> afterwards.</a:t>
             </a:r>
           </a:p>
           <a:p>
             <a:pPr lvl="1"/>
             <a:r>
-              <a:rPr lang="en-US" sz="2400" dirty="0" smtClean="0"/>
-              <a:t>From the two, abstract a “stance model.”</a:t>
+              <a:rPr lang="en-US" dirty="0" smtClean="0"/>
+              <a:t>Example: setting state in forest fire model.</a:t>
             </a:r>
           </a:p>
           <a:p>
             <a:pPr lvl="1"/>
             <a:r>
-              <a:rPr lang="en-US" sz="2400" dirty="0" smtClean="0"/>
-              <a:t>Insert it “behind” the other two models.</a:t>
-            </a:r>
-            <a:endParaRPr lang="en-US" sz="2400" dirty="0"/>
+              <a:rPr lang="en-US" dirty="0" smtClean="0"/>
+              <a:t>Rather than having to write these in each model that needs them, they are turned on by flags and performed in the base environment.</a:t>
+            </a:r>
+            <a:endParaRPr lang="en-US" dirty="0"/>
           </a:p>
         </p:txBody>
       </p:sp>
-      <p:graphicFrame>
-        <p:nvGraphicFramePr>
-          <p:cNvPr id="5" name="Diagram 4"/>
-          <p:cNvGraphicFramePr/>
-          <p:nvPr>
-            <p:extLst>
-              <p:ext uri="{D42A27DB-BD31-4B8C-83A1-F6EECF244321}">
-                <p14:modId xmlns:p14="http://schemas.microsoft.com/office/powerpoint/2010/main" val="3487425669"/>
-              </p:ext>
-            </p:extLst>
-          </p:nvPr>
-        </p:nvGraphicFramePr>
-        <p:xfrm>
-          <a:off x="2055976" y="3622078"/>
-          <a:ext cx="5029200" cy="3022600"/>
-        </p:xfrm>
-        <a:graphic>
-          <a:graphicData uri="http://schemas.openxmlformats.org/drawingml/2006/diagram">
-            <dgm:relIds xmlns:dgm="http://schemas.openxmlformats.org/drawingml/2006/diagram" xmlns:r="http://schemas.openxmlformats.org/officeDocument/2006/relationships" r:dm="rId2" r:lo="rId3" r:qs="rId4" r:cs="rId5"/>
-          </a:graphicData>
-        </a:graphic>
-      </p:graphicFrame>
     </p:spTree>
     <p:extLst>
       <p:ext uri="{BB962C8B-B14F-4D97-AF65-F5344CB8AC3E}">
@@ -15123,6 +14757,157 @@
         </p:nvSpPr>
         <p:spPr>
           <a:xfrm>
+            <a:off x="152400" y="1066800"/>
+            <a:ext cx="8915400" cy="2362200"/>
+          </a:xfrm>
+        </p:spPr>
+        <p:txBody>
+          <a:bodyPr/>
+          <a:lstStyle/>
+          <a:p>
+            <a:r>
+              <a:rPr lang="en-US" sz="2800" dirty="0" smtClean="0"/>
+              <a:t>Abstracting common patterns from models.</a:t>
+            </a:r>
+          </a:p>
+          <a:p>
+            <a:pPr lvl="1"/>
+            <a:r>
+              <a:rPr lang="en-US" sz="2400" dirty="0" smtClean="0"/>
+              <a:t>Begin with a fashion model, with trend-setters and followers.</a:t>
+            </a:r>
+          </a:p>
+          <a:p>
+            <a:pPr lvl="1"/>
+            <a:r>
+              <a:rPr lang="en-US" sz="2400" dirty="0" smtClean="0"/>
+              <a:t>Add a model of asset traders, with value investors and chart followers.</a:t>
+            </a:r>
+          </a:p>
+          <a:p>
+            <a:pPr lvl="1"/>
+            <a:r>
+              <a:rPr lang="en-US" sz="2400" dirty="0" smtClean="0"/>
+              <a:t>From the two, abstract a “stance </a:t>
+            </a:r>
+            <a:r>
+              <a:rPr lang="en-US" sz="2400" dirty="0" smtClean="0"/>
+              <a:t>model”: a concept.</a:t>
+            </a:r>
+            <a:endParaRPr lang="en-US" sz="2400" dirty="0" smtClean="0"/>
+          </a:p>
+          <a:p>
+            <a:pPr lvl="1"/>
+            <a:r>
+              <a:rPr lang="en-US" sz="2400" dirty="0" smtClean="0"/>
+              <a:t>Insert it “behind” the other two models.</a:t>
+            </a:r>
+            <a:endParaRPr lang="en-US" sz="2400" dirty="0"/>
+          </a:p>
+        </p:txBody>
+      </p:sp>
+      <p:graphicFrame>
+        <p:nvGraphicFramePr>
+          <p:cNvPr id="5" name="Diagram 4"/>
+          <p:cNvGraphicFramePr/>
+          <p:nvPr>
+            <p:extLst>
+              <p:ext uri="{D42A27DB-BD31-4B8C-83A1-F6EECF244321}">
+                <p14:modId xmlns:p14="http://schemas.microsoft.com/office/powerpoint/2010/main" val="3487425669"/>
+              </p:ext>
+            </p:extLst>
+          </p:nvPr>
+        </p:nvGraphicFramePr>
+        <p:xfrm>
+          <a:off x="2055976" y="3622078"/>
+          <a:ext cx="5029200" cy="3022600"/>
+        </p:xfrm>
+        <a:graphic>
+          <a:graphicData uri="http://schemas.openxmlformats.org/drawingml/2006/diagram">
+            <dgm:relIds xmlns:dgm="http://schemas.openxmlformats.org/drawingml/2006/diagram" xmlns:r="http://schemas.openxmlformats.org/officeDocument/2006/relationships" r:dm="rId2" r:lo="rId3" r:qs="rId4" r:cs="rId5"/>
+          </a:graphicData>
+        </a:graphic>
+      </p:graphicFrame>
+    </p:spTree>
+    <p:extLst>
+      <p:ext uri="{BB962C8B-B14F-4D97-AF65-F5344CB8AC3E}">
+        <p14:creationId xmlns:p14="http://schemas.microsoft.com/office/powerpoint/2010/main" val="4259044637"/>
+      </p:ext>
+    </p:extLst>
+  </p:cSld>
+  <p:clrMapOvr>
+    <a:masterClrMapping/>
+  </p:clrMapOvr>
+  <p:transition xmlns:p14="http://schemas.microsoft.com/office/powerpoint/2010/main">
+    <p:fade/>
+  </p:transition>
+  <p:timing>
+    <p:tnLst>
+      <p:par>
+        <p:cTn xmlns:p14="http://schemas.microsoft.com/office/powerpoint/2010/main" id="1" dur="indefinite" restart="never" nodeType="tmRoot"/>
+      </p:par>
+    </p:tnLst>
+  </p:timing>
+</p:sld>
+</file>
+
+<file path=ppt/slides/slide14.xml><?xml version="1.0" encoding="utf-8"?>
+<p:sld xmlns:a="http://schemas.openxmlformats.org/drawingml/2006/main" xmlns:r="http://schemas.openxmlformats.org/officeDocument/2006/relationships" xmlns:p="http://schemas.openxmlformats.org/presentationml/2006/main">
+  <p:cSld>
+    <p:spTree>
+      <p:nvGrpSpPr>
+        <p:cNvPr id="1" name=""/>
+        <p:cNvGrpSpPr/>
+        <p:nvPr/>
+      </p:nvGrpSpPr>
+      <p:grpSpPr>
+        <a:xfrm>
+          <a:off x="0" y="0"/>
+          <a:ext cx="0" cy="0"/>
+          <a:chOff x="0" y="0"/>
+          <a:chExt cx="0" cy="0"/>
+        </a:xfrm>
+      </p:grpSpPr>
+      <p:sp>
+        <p:nvSpPr>
+          <p:cNvPr id="2" name="Title 1"/>
+          <p:cNvSpPr>
+            <a:spLocks noGrp="1"/>
+          </p:cNvSpPr>
+          <p:nvPr>
+            <p:ph type="title"/>
+          </p:nvPr>
+        </p:nvSpPr>
+        <p:spPr>
+          <a:xfrm>
+            <a:off x="381000" y="230188"/>
+            <a:ext cx="8382000" cy="677108"/>
+          </a:xfrm>
+        </p:spPr>
+        <p:txBody>
+          <a:bodyPr/>
+          <a:lstStyle/>
+          <a:p>
+            <a:r>
+              <a:rPr lang="en-US" dirty="0" smtClean="0"/>
+              <a:t>ABM and Generic Programming</a:t>
+            </a:r>
+            <a:endParaRPr lang="en-US" dirty="0"/>
+          </a:p>
+        </p:txBody>
+      </p:sp>
+      <p:sp>
+        <p:nvSpPr>
+          <p:cNvPr id="3" name="Text Placeholder 2"/>
+          <p:cNvSpPr>
+            <a:spLocks noGrp="1"/>
+          </p:cNvSpPr>
+          <p:nvPr>
+            <p:ph type="body" sz="quarter" idx="10"/>
+          </p:nvPr>
+        </p:nvSpPr>
+        <p:spPr>
+          <a:xfrm>
             <a:off x="381000" y="1411552"/>
             <a:ext cx="8382000" cy="3158813"/>
           </a:xfrm>
@@ -15228,7 +15013,7 @@
 </p:sld>
 </file>
 
-<file path=ppt/slides/slide14.xml><?xml version="1.0" encoding="utf-8"?>
+<file path=ppt/slides/slide15.xml><?xml version="1.0" encoding="utf-8"?>
 <p:sld xmlns:a="http://schemas.openxmlformats.org/drawingml/2006/main" xmlns:r="http://schemas.openxmlformats.org/officeDocument/2006/relationships" xmlns:p="http://schemas.openxmlformats.org/presentationml/2006/main">
   <p:cSld>
     <p:spTree>
@@ -15598,7 +15383,6 @@
               <a:rPr lang="en-US" dirty="0" smtClean="0"/>
               <a:t>This has worked for a number of models.</a:t>
             </a:r>
-            <a:endParaRPr lang="en-US" dirty="0" smtClean="0"/>
           </a:p>
         </p:txBody>
       </p:sp>
@@ -15606,118 +15390,6 @@
     <p:extLst>
       <p:ext uri="{BB962C8B-B14F-4D97-AF65-F5344CB8AC3E}">
         <p14:creationId xmlns:p14="http://schemas.microsoft.com/office/powerpoint/2010/main" val="2150116417"/>
-      </p:ext>
-    </p:extLst>
-  </p:cSld>
-  <p:clrMapOvr>
-    <a:masterClrMapping/>
-  </p:clrMapOvr>
-  <p:transition xmlns:p14="http://schemas.microsoft.com/office/powerpoint/2010/main">
-    <p:fade/>
-  </p:transition>
-  <p:timing>
-    <p:tnLst>
-      <p:par>
-        <p:cTn xmlns:p14="http://schemas.microsoft.com/office/powerpoint/2010/main" id="1" dur="indefinite" restart="never" nodeType="tmRoot"/>
-      </p:par>
-    </p:tnLst>
-  </p:timing>
-</p:sld>
-</file>
-
-<file path=ppt/slides/slide15.xml><?xml version="1.0" encoding="utf-8"?>
-<p:sld xmlns:a="http://schemas.openxmlformats.org/drawingml/2006/main" xmlns:r="http://schemas.openxmlformats.org/officeDocument/2006/relationships" xmlns:p="http://schemas.openxmlformats.org/presentationml/2006/main">
-  <p:cSld>
-    <p:spTree>
-      <p:nvGrpSpPr>
-        <p:cNvPr id="1" name=""/>
-        <p:cNvGrpSpPr/>
-        <p:nvPr/>
-      </p:nvGrpSpPr>
-      <p:grpSpPr>
-        <a:xfrm>
-          <a:off x="0" y="0"/>
-          <a:ext cx="0" cy="0"/>
-          <a:chOff x="0" y="0"/>
-          <a:chExt cx="0" cy="0"/>
-        </a:xfrm>
-      </p:grpSpPr>
-      <p:sp>
-        <p:nvSpPr>
-          <p:cNvPr id="2" name="Title 1"/>
-          <p:cNvSpPr>
-            <a:spLocks noGrp="1"/>
-          </p:cNvSpPr>
-          <p:nvPr>
-            <p:ph type="title"/>
-          </p:nvPr>
-        </p:nvSpPr>
-        <p:spPr>
-          <a:xfrm>
-            <a:off x="381000" y="230188"/>
-            <a:ext cx="8382000" cy="677108"/>
-          </a:xfrm>
-        </p:spPr>
-        <p:txBody>
-          <a:bodyPr/>
-          <a:lstStyle/>
-          <a:p>
-            <a:r>
-              <a:rPr lang="en-US" dirty="0" smtClean="0"/>
-              <a:t>ABM and Generic Programming</a:t>
-            </a:r>
-            <a:endParaRPr lang="en-US" dirty="0"/>
-          </a:p>
-        </p:txBody>
-      </p:sp>
-      <p:sp>
-        <p:nvSpPr>
-          <p:cNvPr id="3" name="Text Placeholder 2"/>
-          <p:cNvSpPr>
-            <a:spLocks noGrp="1"/>
-          </p:cNvSpPr>
-          <p:nvPr>
-            <p:ph type="body" sz="quarter" idx="10"/>
-          </p:nvPr>
-        </p:nvSpPr>
-        <p:spPr>
-          <a:xfrm>
-            <a:off x="381000" y="1411552"/>
-            <a:ext cx="8382000" cy="1781000"/>
-          </a:xfrm>
-        </p:spPr>
-        <p:txBody>
-          <a:bodyPr/>
-          <a:lstStyle/>
-          <a:p>
-            <a:r>
-              <a:rPr lang="en-US" dirty="0" smtClean="0"/>
-              <a:t>We are now working on ways to treat the entire agent population as a vector, and use matrix multiplication to </a:t>
-            </a:r>
-            <a:r>
-              <a:rPr lang="en-US" dirty="0" smtClean="0"/>
-              <a:t>reset </a:t>
-            </a:r>
-            <a:r>
-              <a:rPr lang="en-US" dirty="0" smtClean="0"/>
-              <a:t>all </a:t>
-            </a:r>
-            <a:r>
-              <a:rPr lang="en-US" dirty="0" smtClean="0"/>
-              <a:t>agents’ </a:t>
-            </a:r>
-            <a:r>
-              <a:rPr lang="en-US" dirty="0" smtClean="0"/>
-              <a:t>states in a single operation.</a:t>
-            </a:r>
-            <a:endParaRPr lang="en-US" dirty="0"/>
-          </a:p>
-        </p:txBody>
-      </p:sp>
-    </p:spTree>
-    <p:extLst>
-      <p:ext uri="{BB962C8B-B14F-4D97-AF65-F5344CB8AC3E}">
-        <p14:creationId xmlns:p14="http://schemas.microsoft.com/office/powerpoint/2010/main" val="4259044637"/>
       </p:ext>
     </p:extLst>
   </p:cSld>
@@ -15766,8 +15438,393 @@
         </p:nvSpPr>
         <p:spPr>
           <a:xfrm>
-            <a:off x="0" y="230188"/>
-            <a:ext cx="9144000" cy="677108"/>
+            <a:off x="381000" y="230188"/>
+            <a:ext cx="8382000" cy="677108"/>
+          </a:xfrm>
+        </p:spPr>
+        <p:txBody>
+          <a:bodyPr/>
+          <a:lstStyle/>
+          <a:p>
+            <a:r>
+              <a:rPr lang="en-US" dirty="0" smtClean="0"/>
+              <a:t>ABM and Generic Programming</a:t>
+            </a:r>
+            <a:endParaRPr lang="en-US" dirty="0"/>
+          </a:p>
+        </p:txBody>
+      </p:sp>
+      <p:sp>
+        <p:nvSpPr>
+          <p:cNvPr id="3" name="Text Placeholder 2"/>
+          <p:cNvSpPr>
+            <a:spLocks noGrp="1"/>
+          </p:cNvSpPr>
+          <p:nvPr>
+            <p:ph type="body" sz="quarter" idx="10"/>
+          </p:nvPr>
+        </p:nvSpPr>
+        <p:spPr>
+          <a:xfrm>
+            <a:off x="381000" y="1411552"/>
+            <a:ext cx="8382000" cy="1781000"/>
+          </a:xfrm>
+        </p:spPr>
+        <p:txBody>
+          <a:bodyPr/>
+          <a:lstStyle/>
+          <a:p>
+            <a:r>
+              <a:rPr lang="en-US" dirty="0" smtClean="0"/>
+              <a:t>We are now working on ways to treat the entire agent population as a vector, and use matrix multiplication to reset all agents’ states in a single operation.</a:t>
+            </a:r>
+            <a:endParaRPr lang="en-US" dirty="0"/>
+          </a:p>
+        </p:txBody>
+      </p:sp>
+    </p:spTree>
+    <p:extLst>
+      <p:ext uri="{BB962C8B-B14F-4D97-AF65-F5344CB8AC3E}">
+        <p14:creationId xmlns:p14="http://schemas.microsoft.com/office/powerpoint/2010/main" val="4259044637"/>
+      </p:ext>
+    </p:extLst>
+  </p:cSld>
+  <p:clrMapOvr>
+    <a:masterClrMapping/>
+  </p:clrMapOvr>
+  <p:transition xmlns:p14="http://schemas.microsoft.com/office/powerpoint/2010/main">
+    <p:fade/>
+  </p:transition>
+  <p:timing>
+    <p:tnLst>
+      <p:par>
+        <p:cTn xmlns:p14="http://schemas.microsoft.com/office/powerpoint/2010/main" id="1" dur="indefinite" restart="never" nodeType="tmRoot"/>
+      </p:par>
+    </p:tnLst>
+  </p:timing>
+</p:sld>
+</file>
+
+<file path=ppt/slides/slide17.xml><?xml version="1.0" encoding="utf-8"?>
+<p:sld xmlns:a="http://schemas.openxmlformats.org/drawingml/2006/main" xmlns:r="http://schemas.openxmlformats.org/officeDocument/2006/relationships" xmlns:p="http://schemas.openxmlformats.org/presentationml/2006/main">
+  <p:cSld>
+    <p:spTree>
+      <p:nvGrpSpPr>
+        <p:cNvPr id="1" name=""/>
+        <p:cNvGrpSpPr/>
+        <p:nvPr/>
+      </p:nvGrpSpPr>
+      <p:grpSpPr>
+        <a:xfrm>
+          <a:off x="0" y="0"/>
+          <a:ext cx="0" cy="0"/>
+          <a:chOff x="0" y="0"/>
+          <a:chExt cx="0" cy="0"/>
+        </a:xfrm>
+      </p:grpSpPr>
+      <p:sp>
+        <p:nvSpPr>
+          <p:cNvPr id="2" name="Title 1"/>
+          <p:cNvSpPr>
+            <a:spLocks noGrp="1"/>
+          </p:cNvSpPr>
+          <p:nvPr>
+            <p:ph type="title"/>
+          </p:nvPr>
+        </p:nvSpPr>
+        <p:spPr>
+          <a:xfrm>
+            <a:off x="381000" y="230188"/>
+            <a:ext cx="8382000" cy="677108"/>
+          </a:xfrm>
+        </p:spPr>
+        <p:txBody>
+          <a:bodyPr/>
+          <a:lstStyle/>
+          <a:p>
+            <a:r>
+              <a:rPr lang="en-US" dirty="0" smtClean="0"/>
+              <a:t>Python</a:t>
+            </a:r>
+            <a:r>
+              <a:rPr lang="en-US" dirty="0" smtClean="0"/>
+              <a:t> </a:t>
+            </a:r>
+            <a:r>
+              <a:rPr lang="en-US" dirty="0" smtClean="0"/>
+              <a:t>and Generic Programming</a:t>
+            </a:r>
+            <a:endParaRPr lang="en-US" dirty="0"/>
+          </a:p>
+        </p:txBody>
+      </p:sp>
+      <p:sp>
+        <p:nvSpPr>
+          <p:cNvPr id="3" name="Text Placeholder 2"/>
+          <p:cNvSpPr>
+            <a:spLocks noGrp="1"/>
+          </p:cNvSpPr>
+          <p:nvPr>
+            <p:ph type="body" sz="quarter" idx="10"/>
+          </p:nvPr>
+        </p:nvSpPr>
+        <p:spPr>
+          <a:xfrm>
+            <a:off x="381000" y="1411552"/>
+            <a:ext cx="8382000" cy="4604337"/>
+          </a:xfrm>
+        </p:spPr>
+        <p:txBody>
+          <a:bodyPr/>
+          <a:lstStyle/>
+          <a:p>
+            <a:r>
+              <a:rPr lang="en-US" dirty="0" smtClean="0"/>
+              <a:t>Python is well-suited to doing generic programming:</a:t>
+            </a:r>
+          </a:p>
+          <a:p>
+            <a:pPr lvl="1"/>
+            <a:r>
+              <a:rPr lang="en-US" dirty="0" smtClean="0"/>
+              <a:t>We can already pass various types into a function </a:t>
+            </a:r>
+            <a:r>
+              <a:rPr lang="en-US" dirty="0"/>
+              <a:t>or a method and its descendants.</a:t>
+            </a:r>
+            <a:endParaRPr lang="en-US" dirty="0" smtClean="0"/>
+          </a:p>
+          <a:p>
+            <a:pPr lvl="1"/>
+            <a:r>
+              <a:rPr lang="en-US" dirty="0" smtClean="0"/>
+              <a:t>We can return various types from a function or a method and its descendants.</a:t>
+            </a:r>
+          </a:p>
+          <a:p>
+            <a:pPr lvl="1"/>
+            <a:r>
+              <a:rPr lang="en-US" dirty="0" smtClean="0"/>
+              <a:t>We can pass in operators when a function might need to handle different types differently: the operator module.</a:t>
+            </a:r>
+          </a:p>
+          <a:p>
+            <a:pPr lvl="2"/>
+            <a:r>
+              <a:rPr lang="en-US" dirty="0" smtClean="0"/>
+              <a:t>Thus we could pass in add() for </a:t>
+            </a:r>
+            <a:r>
+              <a:rPr lang="en-US" dirty="0" err="1" smtClean="0"/>
+              <a:t>ints</a:t>
+            </a:r>
+            <a:r>
+              <a:rPr lang="en-US" dirty="0" smtClean="0"/>
+              <a:t> and our own operator for knots. </a:t>
+            </a:r>
+            <a:endParaRPr lang="en-US" dirty="0"/>
+          </a:p>
+        </p:txBody>
+      </p:sp>
+    </p:spTree>
+    <p:extLst>
+      <p:ext uri="{BB962C8B-B14F-4D97-AF65-F5344CB8AC3E}">
+        <p14:creationId xmlns:p14="http://schemas.microsoft.com/office/powerpoint/2010/main" val="3303779278"/>
+      </p:ext>
+    </p:extLst>
+  </p:cSld>
+  <p:clrMapOvr>
+    <a:masterClrMapping/>
+  </p:clrMapOvr>
+  <p:transition xmlns:p14="http://schemas.microsoft.com/office/powerpoint/2010/main">
+    <p:fade/>
+  </p:transition>
+  <p:timing>
+    <p:tnLst>
+      <p:par>
+        <p:cTn xmlns:p14="http://schemas.microsoft.com/office/powerpoint/2010/main" id="1" dur="indefinite" restart="never" nodeType="tmRoot"/>
+      </p:par>
+    </p:tnLst>
+  </p:timing>
+</p:sld>
+</file>
+
+<file path=ppt/slides/slide18.xml><?xml version="1.0" encoding="utf-8"?>
+<p:sld xmlns:a="http://schemas.openxmlformats.org/drawingml/2006/main" xmlns:r="http://schemas.openxmlformats.org/officeDocument/2006/relationships" xmlns:p="http://schemas.openxmlformats.org/presentationml/2006/main">
+  <p:cSld>
+    <p:spTree>
+      <p:nvGrpSpPr>
+        <p:cNvPr id="1" name=""/>
+        <p:cNvGrpSpPr/>
+        <p:nvPr/>
+      </p:nvGrpSpPr>
+      <p:grpSpPr>
+        <a:xfrm>
+          <a:off x="0" y="0"/>
+          <a:ext cx="0" cy="0"/>
+          <a:chOff x="0" y="0"/>
+          <a:chExt cx="0" cy="0"/>
+        </a:xfrm>
+      </p:grpSpPr>
+      <p:sp>
+        <p:nvSpPr>
+          <p:cNvPr id="2" name="Title 1"/>
+          <p:cNvSpPr>
+            <a:spLocks noGrp="1"/>
+          </p:cNvSpPr>
+          <p:nvPr>
+            <p:ph type="title"/>
+          </p:nvPr>
+        </p:nvSpPr>
+        <p:spPr>
+          <a:xfrm>
+            <a:off x="381000" y="230188"/>
+            <a:ext cx="8382000" cy="677108"/>
+          </a:xfrm>
+        </p:spPr>
+        <p:txBody>
+          <a:bodyPr/>
+          <a:lstStyle/>
+          <a:p>
+            <a:r>
+              <a:rPr lang="en-US" dirty="0" smtClean="0"/>
+              <a:t>Python</a:t>
+            </a:r>
+            <a:r>
+              <a:rPr lang="en-US" dirty="0" smtClean="0"/>
+              <a:t> </a:t>
+            </a:r>
+            <a:r>
+              <a:rPr lang="en-US" dirty="0" smtClean="0"/>
+              <a:t>and Generic Programming</a:t>
+            </a:r>
+            <a:endParaRPr lang="en-US" dirty="0"/>
+          </a:p>
+        </p:txBody>
+      </p:sp>
+      <p:sp>
+        <p:nvSpPr>
+          <p:cNvPr id="3" name="Text Placeholder 2"/>
+          <p:cNvSpPr>
+            <a:spLocks noGrp="1"/>
+          </p:cNvSpPr>
+          <p:nvPr>
+            <p:ph type="body" sz="quarter" idx="10"/>
+          </p:nvPr>
+        </p:nvSpPr>
+        <p:spPr>
+          <a:xfrm>
+            <a:off x="381000" y="1411552"/>
+            <a:ext cx="8382000" cy="3243965"/>
+          </a:xfrm>
+        </p:spPr>
+        <p:txBody>
+          <a:bodyPr/>
+          <a:lstStyle/>
+          <a:p>
+            <a:r>
+              <a:rPr lang="en-US" dirty="0" smtClean="0"/>
+              <a:t>Concepts:</a:t>
+            </a:r>
+          </a:p>
+          <a:p>
+            <a:pPr lvl="1"/>
+            <a:r>
+              <a:rPr lang="en-US" dirty="0" err="1"/>
+              <a:t>isinstance</a:t>
+            </a:r>
+            <a:r>
+              <a:rPr lang="en-US" dirty="0"/>
+              <a:t>(e, </a:t>
+            </a:r>
+            <a:r>
+              <a:rPr lang="en-US" dirty="0" err="1"/>
+              <a:t>collections.Iterable</a:t>
+            </a:r>
+            <a:r>
+              <a:rPr lang="en-US" dirty="0" smtClean="0"/>
+              <a:t>) is along the lines of what </a:t>
+            </a:r>
+            <a:r>
+              <a:rPr lang="en-US" dirty="0" err="1" smtClean="0"/>
+              <a:t>Stepanov</a:t>
+            </a:r>
+            <a:r>
+              <a:rPr lang="en-US" dirty="0" smtClean="0"/>
+              <a:t> and Rose are after.</a:t>
+            </a:r>
+          </a:p>
+          <a:p>
+            <a:pPr lvl="1"/>
+            <a:r>
+              <a:rPr lang="en-US" dirty="0" smtClean="0"/>
+              <a:t>“Duck typing” is a weak substitute for actual, rigorously defined concepts. </a:t>
+            </a:r>
+          </a:p>
+          <a:p>
+            <a:pPr lvl="2"/>
+            <a:r>
+              <a:rPr lang="en-US" dirty="0" smtClean="0"/>
+              <a:t>Rather than actually working out the abstraction that captures x, y and z, just chuck them all in a duck costume!</a:t>
+            </a:r>
+          </a:p>
+        </p:txBody>
+      </p:sp>
+    </p:spTree>
+    <p:extLst>
+      <p:ext uri="{BB962C8B-B14F-4D97-AF65-F5344CB8AC3E}">
+        <p14:creationId xmlns:p14="http://schemas.microsoft.com/office/powerpoint/2010/main" val="3094295442"/>
+      </p:ext>
+    </p:extLst>
+  </p:cSld>
+  <p:clrMapOvr>
+    <a:masterClrMapping/>
+  </p:clrMapOvr>
+  <p:transition xmlns:p14="http://schemas.microsoft.com/office/powerpoint/2010/main">
+    <p:fade/>
+  </p:transition>
+  <p:timing>
+    <p:tnLst>
+      <p:par>
+        <p:cTn xmlns:p14="http://schemas.microsoft.com/office/powerpoint/2010/main" id="1" dur="indefinite" restart="never" nodeType="tmRoot"/>
+      </p:par>
+    </p:tnLst>
+  </p:timing>
+</p:sld>
+</file>
+
+<file path=ppt/slides/slide19.xml><?xml version="1.0" encoding="utf-8"?>
+<p:sld xmlns:a="http://schemas.openxmlformats.org/drawingml/2006/main" xmlns:r="http://schemas.openxmlformats.org/officeDocument/2006/relationships" xmlns:p="http://schemas.openxmlformats.org/presentationml/2006/main">
+  <p:cSld>
+    <p:spTree>
+      <p:nvGrpSpPr>
+        <p:cNvPr id="1" name=""/>
+        <p:cNvGrpSpPr/>
+        <p:nvPr/>
+      </p:nvGrpSpPr>
+      <p:grpSpPr>
+        <a:xfrm>
+          <a:off x="0" y="0"/>
+          <a:ext cx="0" cy="0"/>
+          <a:chOff x="0" y="0"/>
+          <a:chExt cx="0" cy="0"/>
+        </a:xfrm>
+      </p:grpSpPr>
+      <p:sp>
+        <p:nvSpPr>
+          <p:cNvPr id="2" name="Title 1"/>
+          <p:cNvSpPr>
+            <a:spLocks noGrp="1"/>
+          </p:cNvSpPr>
+          <p:nvPr>
+            <p:ph type="title"/>
+          </p:nvPr>
+        </p:nvSpPr>
+        <p:spPr>
+          <a:xfrm>
+            <a:off x="381000" y="230188"/>
+            <a:ext cx="8382000" cy="677108"/>
           </a:xfrm>
         </p:spPr>
         <p:txBody>
@@ -15907,6 +15964,36 @@
           </a:p>
         </p:txBody>
       </p:sp>
+      <p:pic>
+        <p:nvPicPr>
+          <p:cNvPr id="4" name="Picture 3" descr="Stonehenge.jpg"/>
+          <p:cNvPicPr>
+            <a:picLocks noChangeAspect="1"/>
+          </p:cNvPicPr>
+          <p:nvPr/>
+        </p:nvPicPr>
+        <p:blipFill>
+          <a:blip r:embed="rId2">
+            <a:extLst>
+              <a:ext uri="{28A0092B-C50C-407E-A947-70E740481C1C}">
+                <a14:useLocalDpi xmlns:a14="http://schemas.microsoft.com/office/drawing/2010/main" val="0"/>
+              </a:ext>
+            </a:extLst>
+          </a:blip>
+          <a:stretch>
+            <a:fillRect/>
+          </a:stretch>
+        </p:blipFill>
+        <p:spPr>
+          <a:xfrm>
+            <a:off x="4521200" y="3048000"/>
+            <a:ext cx="4140200" cy="3105150"/>
+          </a:xfrm>
+          <a:prstGeom prst="rect">
+            <a:avLst/>
+          </a:prstGeom>
+        </p:spPr>
+      </p:pic>
     </p:spTree>
     <p:extLst>
       <p:ext uri="{BB962C8B-B14F-4D97-AF65-F5344CB8AC3E}">
@@ -15930,7 +16017,117 @@
 </p:sld>
 </file>
 
-<file path=ppt/slides/slide17.xml><?xml version="1.0" encoding="utf-8"?>
+<file path=ppt/slides/slide2.xml><?xml version="1.0" encoding="utf-8"?>
+<p:sld xmlns:a="http://schemas.openxmlformats.org/drawingml/2006/main" xmlns:r="http://schemas.openxmlformats.org/officeDocument/2006/relationships" xmlns:p="http://schemas.openxmlformats.org/presentationml/2006/main">
+  <p:cSld>
+    <p:spTree>
+      <p:nvGrpSpPr>
+        <p:cNvPr id="1" name=""/>
+        <p:cNvGrpSpPr/>
+        <p:nvPr/>
+      </p:nvGrpSpPr>
+      <p:grpSpPr>
+        <a:xfrm>
+          <a:off x="0" y="0"/>
+          <a:ext cx="0" cy="0"/>
+          <a:chOff x="0" y="0"/>
+          <a:chExt cx="0" cy="0"/>
+        </a:xfrm>
+      </p:grpSpPr>
+      <p:sp>
+        <p:nvSpPr>
+          <p:cNvPr id="2" name="Title 1"/>
+          <p:cNvSpPr>
+            <a:spLocks noGrp="1"/>
+          </p:cNvSpPr>
+          <p:nvPr>
+            <p:ph type="title"/>
+          </p:nvPr>
+        </p:nvSpPr>
+        <p:spPr>
+          <a:xfrm>
+            <a:off x="381000" y="230188"/>
+            <a:ext cx="8382000" cy="1163395"/>
+          </a:xfrm>
+        </p:spPr>
+        <p:txBody>
+          <a:bodyPr>
+            <a:normAutofit/>
+          </a:bodyPr>
+          <a:lstStyle/>
+          <a:p>
+            <a:r>
+              <a:rPr lang="en-US" dirty="0" smtClean="0"/>
+              <a:t>Generic Programming</a:t>
+            </a:r>
+            <a:br>
+              <a:rPr lang="en-US" dirty="0" smtClean="0"/>
+            </a:br>
+            <a:r>
+              <a:rPr lang="en-US" sz="3600" dirty="0" smtClean="0">
+                <a:solidFill>
+                  <a:schemeClr val="tx2"/>
+                </a:solidFill>
+              </a:rPr>
+              <a:t>Abstracting logic from data</a:t>
+            </a:r>
+            <a:endParaRPr lang="en-US" dirty="0">
+              <a:solidFill>
+                <a:schemeClr val="tx2"/>
+              </a:solidFill>
+            </a:endParaRPr>
+          </a:p>
+        </p:txBody>
+      </p:sp>
+      <p:pic>
+        <p:nvPicPr>
+          <p:cNvPr id="4" name="Picture 3" descr="Cover.aspx.jpeg"/>
+          <p:cNvPicPr>
+            <a:picLocks noChangeAspect="1"/>
+          </p:cNvPicPr>
+          <p:nvPr/>
+        </p:nvPicPr>
+        <p:blipFill>
+          <a:blip r:embed="rId3">
+            <a:extLst>
+              <a:ext uri="{28A0092B-C50C-407E-A947-70E740481C1C}">
+                <a14:useLocalDpi xmlns:a14="http://schemas.microsoft.com/office/drawing/2010/main" val="0"/>
+              </a:ext>
+            </a:extLst>
+          </a:blip>
+          <a:stretch>
+            <a:fillRect/>
+          </a:stretch>
+        </p:blipFill>
+        <p:spPr>
+          <a:xfrm>
+            <a:off x="4038600" y="1752600"/>
+            <a:ext cx="3606412" cy="4724400"/>
+          </a:xfrm>
+          <a:prstGeom prst="rect">
+            <a:avLst/>
+          </a:prstGeom>
+        </p:spPr>
+      </p:pic>
+    </p:spTree>
+  </p:cSld>
+  <p:clrMapOvr>
+    <a:masterClrMapping/>
+  </p:clrMapOvr>
+  <p:transition xmlns:p14="http://schemas.microsoft.com/office/powerpoint/2010/main">
+    <p:fade/>
+  </p:transition>
+  <p:timing>
+    <p:tnLst>
+      <p:par>
+        <p:cTn xmlns:p14="http://schemas.microsoft.com/office/powerpoint/2010/main" id="1" dur="indefinite" restart="never" nodeType="tmRoot"/>
+      </p:par>
+    </p:tnLst>
+  </p:timing>
+</p:sld>
+</file>
+
+<file path=ppt/slides/slide20.xml><?xml version="1.0" encoding="utf-8"?>
 <p:sld xmlns:a="http://schemas.openxmlformats.org/drawingml/2006/main" xmlns:r="http://schemas.openxmlformats.org/officeDocument/2006/relationships" xmlns:p="http://schemas.openxmlformats.org/presentationml/2006/main">
   <p:cSld>
     <p:spTree>
@@ -16186,7 +16383,7 @@
 </p:sld>
 </file>
 
-<file path=ppt/slides/slide18.xml><?xml version="1.0" encoding="utf-8"?>
+<file path=ppt/slides/slide21.xml><?xml version="1.0" encoding="utf-8"?>
 <p:sld xmlns:a="http://schemas.openxmlformats.org/drawingml/2006/main" xmlns:r="http://schemas.openxmlformats.org/officeDocument/2006/relationships" xmlns:p="http://schemas.openxmlformats.org/presentationml/2006/main">
   <p:cSld>
     <p:spTree>
@@ -16354,149 +16551,7 @@
 </p:sld>
 </file>
 
-<file path=ppt/slides/slide19.xml><?xml version="1.0" encoding="utf-8"?>
-<p:sld xmlns:a="http://schemas.openxmlformats.org/drawingml/2006/main" xmlns:r="http://schemas.openxmlformats.org/officeDocument/2006/relationships" xmlns:p="http://schemas.openxmlformats.org/presentationml/2006/main">
-  <p:cSld>
-    <p:spTree>
-      <p:nvGrpSpPr>
-        <p:cNvPr id="1" name=""/>
-        <p:cNvGrpSpPr/>
-        <p:nvPr/>
-      </p:nvGrpSpPr>
-      <p:grpSpPr>
-        <a:xfrm>
-          <a:off x="0" y="0"/>
-          <a:ext cx="0" cy="0"/>
-          <a:chOff x="0" y="0"/>
-          <a:chExt cx="0" cy="0"/>
-        </a:xfrm>
-      </p:grpSpPr>
-      <p:sp>
-        <p:nvSpPr>
-          <p:cNvPr id="2" name="Title 1"/>
-          <p:cNvSpPr>
-            <a:spLocks noGrp="1"/>
-          </p:cNvSpPr>
-          <p:nvPr>
-            <p:ph type="title"/>
-          </p:nvPr>
-        </p:nvSpPr>
-        <p:spPr>
-          <a:xfrm>
-            <a:off x="0" y="230188"/>
-            <a:ext cx="9144000" cy="677108"/>
-          </a:xfrm>
-        </p:spPr>
-        <p:txBody>
-          <a:bodyPr/>
-          <a:lstStyle/>
-          <a:p>
-            <a:r>
-              <a:rPr lang="en-US" dirty="0" smtClean="0"/>
-              <a:t>How to Do Generic Programming</a:t>
-            </a:r>
-            <a:endParaRPr lang="en-US" dirty="0"/>
-          </a:p>
-        </p:txBody>
-      </p:sp>
-      <p:sp>
-        <p:nvSpPr>
-          <p:cNvPr id="3" name="Text Placeholder 2"/>
-          <p:cNvSpPr>
-            <a:spLocks noGrp="1"/>
-          </p:cNvSpPr>
-          <p:nvPr>
-            <p:ph type="body" sz="quarter" idx="10"/>
-          </p:nvPr>
-        </p:nvSpPr>
-        <p:spPr>
-          <a:xfrm>
-            <a:off x="381000" y="1371600"/>
-            <a:ext cx="8382000" cy="3811299"/>
-          </a:xfrm>
-        </p:spPr>
-        <p:txBody>
-          <a:bodyPr/>
-          <a:lstStyle/>
-          <a:p>
-            <a:r>
-              <a:rPr lang="en-US" dirty="0" smtClean="0"/>
-              <a:t>Flat is better than nested?</a:t>
-            </a:r>
-          </a:p>
-          <a:p>
-            <a:pPr lvl="1"/>
-            <a:r>
-              <a:rPr lang="en-US" dirty="0" smtClean="0"/>
-              <a:t>Trade</a:t>
-            </a:r>
-            <a:r>
-              <a:rPr lang="en-US" dirty="0"/>
-              <a:t>-off: the resulting code is going to be </a:t>
-            </a:r>
-            <a:r>
-              <a:rPr lang="en-US" dirty="0" smtClean="0"/>
-              <a:t>harder to grasp </a:t>
-            </a:r>
-            <a:r>
-              <a:rPr lang="en-US" dirty="0"/>
-              <a:t>for people not familiar with </a:t>
-            </a:r>
-            <a:r>
-              <a:rPr lang="en-US" dirty="0" smtClean="0"/>
-              <a:t>such abstractions.</a:t>
-            </a:r>
-          </a:p>
-          <a:p>
-            <a:pPr lvl="1"/>
-            <a:r>
-              <a:rPr lang="en-US" dirty="0" smtClean="0"/>
-              <a:t>This </a:t>
-            </a:r>
-            <a:r>
-              <a:rPr lang="en-US" dirty="0"/>
-              <a:t>is OK, because it enables skilled software engineers to create a “fill-in-the-template” system for the use of social scientists who are not highly skilled </a:t>
-            </a:r>
-            <a:r>
-              <a:rPr lang="en-US" dirty="0" smtClean="0"/>
-              <a:t>programmers</a:t>
-            </a:r>
-            <a:r>
-              <a:rPr lang="en-US" dirty="0"/>
-              <a:t>.</a:t>
-            </a:r>
-            <a:endParaRPr lang="en-US" dirty="0"/>
-          </a:p>
-          <a:p>
-            <a:pPr lvl="1"/>
-            <a:endParaRPr lang="en-US" dirty="0"/>
-          </a:p>
-        </p:txBody>
-      </p:sp>
-    </p:spTree>
-    <p:extLst>
-      <p:ext uri="{BB962C8B-B14F-4D97-AF65-F5344CB8AC3E}">
-        <p14:creationId xmlns:p14="http://schemas.microsoft.com/office/powerpoint/2010/main" val="3526871055"/>
-      </p:ext>
-    </p:extLst>
-  </p:cSld>
-  <p:clrMapOvr>
-    <a:masterClrMapping/>
-  </p:clrMapOvr>
-  <p:transition xmlns:p14="http://schemas.microsoft.com/office/powerpoint/2010/main">
-    <p:fade/>
-  </p:transition>
-  <p:timing>
-    <p:tnLst>
-      <p:par>
-        <p:cTn xmlns:p14="http://schemas.microsoft.com/office/powerpoint/2010/main" id="1" dur="indefinite" restart="never" nodeType="tmRoot"/>
-      </p:par>
-    </p:tnLst>
-  </p:timing>
-</p:sld>
-</file>
-
-<file path=ppt/slides/slide2.xml><?xml version="1.0" encoding="utf-8"?>
+<file path=ppt/slides/slide22.xml><?xml version="1.0" encoding="utf-8"?>
 <p:sld xmlns:a="http://schemas.openxmlformats.org/drawingml/2006/main" xmlns:r="http://schemas.openxmlformats.org/officeDocument/2006/relationships" xmlns:p="http://schemas.openxmlformats.org/presentationml/2006/main">
   <p:cSld>
     <p:spTree>
@@ -16526,35 +16581,18 @@
         <p:spPr>
           <a:xfrm>
             <a:off x="381000" y="230188"/>
-            <a:ext cx="8382000" cy="1163395"/>
+            <a:ext cx="8382000" cy="677108"/>
           </a:xfrm>
         </p:spPr>
         <p:txBody>
-          <a:bodyPr>
-            <a:normAutofit/>
-          </a:bodyPr>
+          <a:bodyPr/>
           <a:lstStyle/>
           <a:p>
             <a:r>
               <a:rPr lang="en-US" dirty="0" smtClean="0"/>
-              <a:t>Generic Programming</a:t>
-            </a:r>
-            <a:br>
-              <a:rPr lang="en-US" dirty="0" smtClean="0"/>
-            </a:br>
-            <a:r>
-              <a:rPr lang="en-US" sz="3600" dirty="0" smtClean="0">
-                <a:solidFill>
-                  <a:schemeClr val="tx2"/>
-                </a:solidFill>
-              </a:rPr>
-              <a:t>Abstracting logic from data</a:t>
-            </a:r>
-            <a:endParaRPr lang="en-US" dirty="0">
-              <a:solidFill>
-                <a:schemeClr val="tx2"/>
-              </a:solidFill>
-            </a:endParaRPr>
+              <a:t>How to Do Generic Programming</a:t>
+            </a:r>
+            <a:endParaRPr lang="en-US" dirty="0"/>
           </a:p>
         </p:txBody>
       </p:sp>
@@ -16570,89 +16608,85 @@
         </p:nvSpPr>
         <p:spPr>
           <a:xfrm>
-            <a:off x="381000" y="1828800"/>
-            <a:ext cx="8382000" cy="3502497"/>
+            <a:off x="381000" y="1371600"/>
+            <a:ext cx="8382000" cy="4352986"/>
           </a:xfrm>
         </p:spPr>
         <p:txBody>
-          <a:bodyPr>
-            <a:normAutofit/>
-          </a:bodyPr>
+          <a:bodyPr/>
           <a:lstStyle/>
           <a:p>
             <a:r>
               <a:rPr lang="en-US" dirty="0" smtClean="0"/>
-              <a:t>Inspired by abstract algebra</a:t>
+              <a:t>Flat is better than nested</a:t>
+            </a:r>
+            <a:r>
+              <a:rPr lang="en-US" dirty="0" smtClean="0"/>
+              <a:t>?</a:t>
             </a:r>
           </a:p>
           <a:p>
             <a:pPr lvl="1"/>
             <a:r>
               <a:rPr lang="en-US" dirty="0" smtClean="0"/>
-              <a:t>“Addition” can be any operation that follows the </a:t>
-            </a:r>
-            <a:r>
-              <a:rPr lang="en-US" i="1" dirty="0" smtClean="0"/>
-              <a:t>pattern</a:t>
-            </a:r>
+              <a:t>We have chosen nested.</a:t>
+            </a:r>
+            <a:endParaRPr lang="en-US" dirty="0" smtClean="0"/>
+          </a:p>
+          <a:p>
+            <a:pPr lvl="1"/>
             <a:r>
               <a:rPr lang="en-US" dirty="0" smtClean="0"/>
-              <a:t> of addition</a:t>
+              <a:t>Trade</a:t>
+            </a:r>
+            <a:r>
+              <a:rPr lang="en-US" dirty="0"/>
+              <a:t>-off: the resulting code is going to be </a:t>
+            </a:r>
+            <a:r>
+              <a:rPr lang="en-US" dirty="0" smtClean="0"/>
+              <a:t>harder to grasp </a:t>
+            </a:r>
+            <a:r>
+              <a:rPr lang="en-US" dirty="0"/>
+              <a:t>for people not familiar with </a:t>
+            </a:r>
+            <a:r>
+              <a:rPr lang="en-US" dirty="0" smtClean="0"/>
+              <a:t>such abstractions.</a:t>
             </a:r>
           </a:p>
           <a:p>
             <a:pPr lvl="1"/>
             <a:r>
               <a:rPr lang="en-US" dirty="0" smtClean="0"/>
-              <a:t>The addition operation should:</a:t>
-            </a:r>
-          </a:p>
-          <a:p>
-            <a:pPr lvl="2"/>
+              <a:t>This </a:t>
+            </a:r>
+            <a:r>
+              <a:rPr lang="en-US" dirty="0"/>
+              <a:t>is OK, because it enables skilled software engineers to create a “fill-in-the-template” system for the use of social scientists who are not highly skilled </a:t>
+            </a:r>
             <a:r>
               <a:rPr lang="en-US" dirty="0" smtClean="0"/>
-              <a:t>Be associative</a:t>
-            </a:r>
-          </a:p>
-          <a:p>
-            <a:pPr lvl="2"/>
-            <a:r>
-              <a:rPr lang="en-US" dirty="0" smtClean="0"/>
-              <a:t>Be commutative</a:t>
-            </a:r>
-          </a:p>
-          <a:p>
-            <a:pPr lvl="2"/>
-            <a:r>
-              <a:rPr lang="en-US" dirty="0" smtClean="0"/>
-              <a:t>Have an identity element (e.g., 0, or the unknot)</a:t>
-            </a:r>
+              <a:t>programmers</a:t>
+            </a:r>
+            <a:r>
+              <a:rPr lang="en-US" dirty="0"/>
+              <a:t>.</a:t>
+            </a:r>
+          </a:p>
+          <a:p>
+            <a:pPr lvl="1"/>
+            <a:endParaRPr lang="en-US" dirty="0"/>
           </a:p>
         </p:txBody>
       </p:sp>
-      <p:graphicFrame>
-        <p:nvGraphicFramePr>
-          <p:cNvPr id="5" name="Diagram 4"/>
-          <p:cNvGraphicFramePr/>
-          <p:nvPr>
-            <p:extLst>
-              <p:ext uri="{D42A27DB-BD31-4B8C-83A1-F6EECF244321}">
-                <p14:modId xmlns:p14="http://schemas.microsoft.com/office/powerpoint/2010/main" val="3339970318"/>
-              </p:ext>
-            </p:extLst>
-          </p:nvPr>
-        </p:nvGraphicFramePr>
-        <p:xfrm>
-          <a:off x="5181600" y="5029200"/>
-          <a:ext cx="3124200" cy="1676400"/>
-        </p:xfrm>
-        <a:graphic>
-          <a:graphicData uri="http://schemas.openxmlformats.org/drawingml/2006/diagram">
-            <dgm:relIds xmlns:dgm="http://schemas.openxmlformats.org/drawingml/2006/diagram" xmlns:r="http://schemas.openxmlformats.org/officeDocument/2006/relationships" r:dm="rId3" r:lo="rId4" r:qs="rId5" r:cs="rId6"/>
-          </a:graphicData>
-        </a:graphic>
-      </p:graphicFrame>
     </p:spTree>
+    <p:extLst>
+      <p:ext uri="{BB962C8B-B14F-4D97-AF65-F5344CB8AC3E}">
+        <p14:creationId xmlns:p14="http://schemas.microsoft.com/office/powerpoint/2010/main" val="3526871055"/>
+      </p:ext>
+    </p:extLst>
   </p:cSld>
   <p:clrMapOvr>
     <a:masterClrMapping/>
@@ -16670,7 +16704,7 @@
 </p:sld>
 </file>
 
-<file path=ppt/slides/slide20.xml><?xml version="1.0" encoding="utf-8"?>
+<file path=ppt/slides/slide23.xml><?xml version="1.0" encoding="utf-8"?>
 <p:sld xmlns:a="http://schemas.openxmlformats.org/drawingml/2006/main" xmlns:r="http://schemas.openxmlformats.org/officeDocument/2006/relationships" xmlns:p="http://schemas.openxmlformats.org/presentationml/2006/main">
   <p:cSld>
     <p:spTree>
@@ -16699,8 +16733,8 @@
         </p:nvSpPr>
         <p:spPr>
           <a:xfrm>
-            <a:off x="0" y="230188"/>
-            <a:ext cx="9144000" cy="677108"/>
+            <a:off x="533400" y="230188"/>
+            <a:ext cx="8001000" cy="677108"/>
           </a:xfrm>
         </p:spPr>
         <p:txBody>
@@ -16942,7 +16976,111 @@
 </p:sld>
 </file>
 
-<file path=ppt/slides/slide21.xml><?xml version="1.0" encoding="utf-8"?>
+<file path=ppt/slides/slide24.xml><?xml version="1.0" encoding="utf-8"?>
+<p:sld xmlns:a="http://schemas.openxmlformats.org/drawingml/2006/main" xmlns:r="http://schemas.openxmlformats.org/officeDocument/2006/relationships" xmlns:p="http://schemas.openxmlformats.org/presentationml/2006/main">
+  <p:cSld>
+    <p:spTree>
+      <p:nvGrpSpPr>
+        <p:cNvPr id="1" name=""/>
+        <p:cNvGrpSpPr/>
+        <p:nvPr/>
+      </p:nvGrpSpPr>
+      <p:grpSpPr>
+        <a:xfrm>
+          <a:off x="0" y="0"/>
+          <a:ext cx="0" cy="0"/>
+          <a:chOff x="0" y="0"/>
+          <a:chExt cx="0" cy="0"/>
+        </a:xfrm>
+      </p:grpSpPr>
+      <p:sp>
+        <p:nvSpPr>
+          <p:cNvPr id="2" name="Title 1"/>
+          <p:cNvSpPr>
+            <a:spLocks noGrp="1"/>
+          </p:cNvSpPr>
+          <p:nvPr>
+            <p:ph type="title"/>
+          </p:nvPr>
+        </p:nvSpPr>
+        <p:spPr>
+          <a:xfrm>
+            <a:off x="381000" y="230188"/>
+            <a:ext cx="8153400" cy="677108"/>
+          </a:xfrm>
+        </p:spPr>
+        <p:txBody>
+          <a:bodyPr/>
+          <a:lstStyle/>
+          <a:p>
+            <a:r>
+              <a:rPr lang="en-US" dirty="0" smtClean="0"/>
+              <a:t>Final note</a:t>
+            </a:r>
+            <a:endParaRPr lang="en-US" dirty="0"/>
+          </a:p>
+        </p:txBody>
+      </p:sp>
+      <p:sp>
+        <p:nvSpPr>
+          <p:cNvPr id="3" name="Text Placeholder 2"/>
+          <p:cNvSpPr>
+            <a:spLocks noGrp="1"/>
+          </p:cNvSpPr>
+          <p:nvPr>
+            <p:ph type="body" sz="quarter" idx="10"/>
+          </p:nvPr>
+        </p:nvSpPr>
+        <p:spPr>
+          <a:xfrm>
+            <a:off x="381000" y="1371600"/>
+            <a:ext cx="8382000" cy="894604"/>
+          </a:xfrm>
+        </p:spPr>
+        <p:txBody>
+          <a:bodyPr/>
+          <a:lstStyle/>
+          <a:p>
+            <a:r>
+              <a:rPr lang="en-US" dirty="0" smtClean="0"/>
+              <a:t>Contributors welcome! The project is on </a:t>
+            </a:r>
+            <a:r>
+              <a:rPr lang="en-US" dirty="0" err="1" smtClean="0"/>
+              <a:t>GitHub</a:t>
+            </a:r>
+            <a:r>
+              <a:rPr lang="en-US" dirty="0" smtClean="0"/>
+              <a:t>.</a:t>
+            </a:r>
+            <a:endParaRPr lang="en-US" dirty="0" smtClean="0"/>
+          </a:p>
+        </p:txBody>
+      </p:sp>
+    </p:spTree>
+    <p:extLst>
+      <p:ext uri="{BB962C8B-B14F-4D97-AF65-F5344CB8AC3E}">
+        <p14:creationId xmlns:p14="http://schemas.microsoft.com/office/powerpoint/2010/main" val="3965056846"/>
+      </p:ext>
+    </p:extLst>
+  </p:cSld>
+  <p:clrMapOvr>
+    <a:masterClrMapping/>
+  </p:clrMapOvr>
+  <p:transition xmlns:p14="http://schemas.microsoft.com/office/powerpoint/2010/main">
+    <p:fade/>
+  </p:transition>
+  <p:timing>
+    <p:tnLst>
+      <p:par>
+        <p:cTn xmlns:p14="http://schemas.microsoft.com/office/powerpoint/2010/main" id="1" dur="indefinite" restart="never" nodeType="tmRoot"/>
+      </p:par>
+    </p:tnLst>
+  </p:timing>
+</p:sld>
+</file>
+
+<file path=ppt/slides/slide25.xml><?xml version="1.0" encoding="utf-8"?>
 <p:sld xmlns:a="http://schemas.openxmlformats.org/drawingml/2006/main" xmlns:r="http://schemas.openxmlformats.org/officeDocument/2006/relationships" xmlns:p="http://schemas.openxmlformats.org/presentationml/2006/main">
   <p:cSld>
     <p:spTree>
@@ -17008,13 +17146,13 @@
         </p:nvSpPr>
         <p:spPr>
           <a:xfrm>
-            <a:off x="381000" y="1295400"/>
-            <a:ext cx="8382000" cy="5029200"/>
+            <a:off x="381000" y="838200"/>
+            <a:ext cx="8382000" cy="5486400"/>
           </a:xfrm>
         </p:spPr>
         <p:txBody>
           <a:bodyPr>
-            <a:normAutofit/>
+            <a:normAutofit fontScale="92500" lnSpcReduction="20000"/>
           </a:bodyPr>
           <a:lstStyle/>
           <a:p>
@@ -17060,6 +17198,29 @@
                 <a:hlinkClick r:id="rId3"/>
               </a:rPr>
               <a:t>File:Knot_with_borromean_rings_in_jsj_decomp_small.png</a:t>
+            </a:r>
+            <a:endParaRPr lang="en-US" dirty="0" smtClean="0"/>
+          </a:p>
+          <a:p>
+            <a:r>
+              <a:rPr lang="en-US" dirty="0"/>
+              <a:t>"Stonehenge on 27.01.08" by </a:t>
+            </a:r>
+            <a:r>
+              <a:rPr lang="en-US" dirty="0" err="1"/>
+              <a:t>Mavratti</a:t>
+            </a:r>
+            <a:r>
+              <a:rPr lang="en-US" dirty="0"/>
+              <a:t> - Own work. Licensed under Public Domain via Wikimedia Commons - https://</a:t>
+            </a:r>
+            <a:r>
+              <a:rPr lang="en-US" dirty="0" err="1"/>
+              <a:t>commons.wikimedia.org</a:t>
+            </a:r>
+            <a:r>
+              <a:rPr lang="en-US" dirty="0"/>
+              <a:t>/wiki/File:Stonehenge_on_27.01.08.jpg#/media/File:Stonehenge_on_27.01.08.jpg</a:t>
             </a:r>
             <a:endParaRPr lang="en-US" dirty="0" smtClean="0"/>
           </a:p>
@@ -17097,7 +17258,7 @@
 </p:sld>
 </file>
 
-<file path=ppt/slides/slide22.xml><?xml version="1.0" encoding="utf-8"?>
+<file path=ppt/slides/slide3.xml><?xml version="1.0" encoding="utf-8"?>
 <p:sld xmlns:a="http://schemas.openxmlformats.org/drawingml/2006/main" xmlns:r="http://schemas.openxmlformats.org/officeDocument/2006/relationships" xmlns:p="http://schemas.openxmlformats.org/presentationml/2006/main">
   <p:cSld>
     <p:spTree>
@@ -17126,23 +17287,31 @@
         </p:nvSpPr>
         <p:spPr>
           <a:xfrm>
-            <a:off x="381000" y="230189"/>
-            <a:ext cx="8382000" cy="836612"/>
+            <a:off x="381000" y="230188"/>
+            <a:ext cx="8382000" cy="1163395"/>
           </a:xfrm>
         </p:spPr>
         <p:txBody>
           <a:bodyPr>
-            <a:normAutofit fontScale="90000"/>
+            <a:normAutofit/>
           </a:bodyPr>
           <a:lstStyle/>
           <a:p>
             <a:r>
               <a:rPr lang="en-US" dirty="0" smtClean="0"/>
-              <a:t>Credits</a:t>
+              <a:t>Generic Programming</a:t>
             </a:r>
             <a:br>
               <a:rPr lang="en-US" dirty="0" smtClean="0"/>
             </a:br>
+            <a:r>
+              <a:rPr lang="en-US" sz="3600" dirty="0" smtClean="0">
+                <a:solidFill>
+                  <a:schemeClr val="tx2"/>
+                </a:solidFill>
+              </a:rPr>
+              <a:t>Abstracting logic from data</a:t>
+            </a:r>
             <a:endParaRPr lang="en-US" dirty="0">
               <a:solidFill>
                 <a:schemeClr val="tx2"/>
@@ -17163,8 +17332,8 @@
         </p:nvSpPr>
         <p:spPr>
           <a:xfrm>
-            <a:off x="381000" y="1295400"/>
-            <a:ext cx="8382000" cy="5029200"/>
+            <a:off x="381000" y="1828800"/>
+            <a:ext cx="8382000" cy="3502497"/>
           </a:xfrm>
         </p:spPr>
         <p:txBody>
@@ -17173,66 +17342,82 @@
           </a:bodyPr>
           <a:lstStyle/>
           <a:p>
-            <a:endParaRPr lang="en-US" dirty="0" smtClean="0"/>
-          </a:p>
-          <a:p>
-            <a:r>
-              <a:rPr lang="en-US" dirty="0"/>
-              <a:t>"Knot with </a:t>
-            </a:r>
-            <a:r>
-              <a:rPr lang="en-US" dirty="0" err="1"/>
-              <a:t>borromean</a:t>
-            </a:r>
-            <a:r>
-              <a:rPr lang="en-US" dirty="0"/>
-              <a:t> rings in </a:t>
-            </a:r>
-            <a:r>
-              <a:rPr lang="en-US" dirty="0" err="1"/>
-              <a:t>jsj</a:t>
-            </a:r>
-            <a:r>
-              <a:rPr lang="en-US" dirty="0"/>
-              <a:t> </a:t>
-            </a:r>
-            <a:r>
-              <a:rPr lang="en-US" dirty="0" err="1"/>
-              <a:t>decomp</a:t>
-            </a:r>
-            <a:r>
-              <a:rPr lang="en-US" dirty="0"/>
-              <a:t> small". Licensed under CC BY-SA 3.0 via Wikipedia - </a:t>
-            </a:r>
-            <a:r>
-              <a:rPr lang="en-US" dirty="0">
-                <a:hlinkClick r:id="rId3"/>
-              </a:rPr>
-              <a:t>https://en.wikipedia.org/wiki/File:Knot_with_borromean_rings_in_jsj_decomp_small.png#/media/</a:t>
-            </a:r>
-            <a:r>
-              <a:rPr lang="en-US" dirty="0" smtClean="0">
-                <a:hlinkClick r:id="rId3"/>
-              </a:rPr>
-              <a:t>File:Knot_with_borromean_rings_in_jsj_decomp_small.png</a:t>
-            </a:r>
-            <a:endParaRPr lang="en-US" dirty="0" smtClean="0"/>
-          </a:p>
-          <a:p>
             <a:r>
               <a:rPr lang="en-US" dirty="0" smtClean="0"/>
-              <a:t>The Mesa team at George Mason has contributed code to this project.</a:t>
-            </a:r>
-          </a:p>
-          <a:p>
-            <a:endParaRPr lang="en-US" dirty="0" smtClean="0"/>
+              <a:t>Inspired by abstract algebra</a:t>
+            </a:r>
+          </a:p>
+          <a:p>
+            <a:pPr lvl="1"/>
+            <a:r>
+              <a:rPr lang="en-US" dirty="0" smtClean="0"/>
+              <a:t>“Addition” can be any operation that follows the </a:t>
+            </a:r>
+            <a:r>
+              <a:rPr lang="en-US" i="1" dirty="0" smtClean="0"/>
+              <a:t>pattern</a:t>
+            </a:r>
+            <a:r>
+              <a:rPr lang="en-US" dirty="0" smtClean="0"/>
+              <a:t> of addition</a:t>
+            </a:r>
+          </a:p>
+          <a:p>
+            <a:pPr lvl="1"/>
+            <a:r>
+              <a:rPr lang="en-US" dirty="0" smtClean="0"/>
+              <a:t>The addition operation should:</a:t>
+            </a:r>
+          </a:p>
+          <a:p>
+            <a:pPr lvl="2"/>
+            <a:r>
+              <a:rPr lang="en-US" dirty="0" smtClean="0"/>
+              <a:t>Be associative</a:t>
+            </a:r>
+          </a:p>
+          <a:p>
+            <a:pPr lvl="2"/>
+            <a:r>
+              <a:rPr lang="en-US" dirty="0" smtClean="0"/>
+              <a:t>Be commutative</a:t>
+            </a:r>
+          </a:p>
+          <a:p>
+            <a:pPr lvl="2"/>
+            <a:r>
+              <a:rPr lang="en-US" dirty="0" smtClean="0"/>
+              <a:t>Have an identity element (e.g., 0, or the unknot)</a:t>
+            </a:r>
           </a:p>
         </p:txBody>
       </p:sp>
+      <p:graphicFrame>
+        <p:nvGraphicFramePr>
+          <p:cNvPr id="5" name="Diagram 4"/>
+          <p:cNvGraphicFramePr/>
+          <p:nvPr>
+            <p:extLst>
+              <p:ext uri="{D42A27DB-BD31-4B8C-83A1-F6EECF244321}">
+                <p14:modId xmlns:p14="http://schemas.microsoft.com/office/powerpoint/2010/main" val="1420844482"/>
+              </p:ext>
+            </p:extLst>
+          </p:nvPr>
+        </p:nvGraphicFramePr>
+        <p:xfrm>
+          <a:off x="5181600" y="5029200"/>
+          <a:ext cx="3124200" cy="1676400"/>
+        </p:xfrm>
+        <a:graphic>
+          <a:graphicData uri="http://schemas.openxmlformats.org/drawingml/2006/diagram">
+            <dgm:relIds xmlns:dgm="http://schemas.openxmlformats.org/drawingml/2006/diagram" xmlns:r="http://schemas.openxmlformats.org/officeDocument/2006/relationships" r:dm="rId3" r:lo="rId4" r:qs="rId5" r:cs="rId6"/>
+          </a:graphicData>
+        </a:graphic>
+      </p:graphicFrame>
     </p:spTree>
     <p:extLst>
       <p:ext uri="{BB962C8B-B14F-4D97-AF65-F5344CB8AC3E}">
-        <p14:creationId xmlns:p14="http://schemas.microsoft.com/office/powerpoint/2010/main" val="3729891041"/>
+        <p14:creationId xmlns:p14="http://schemas.microsoft.com/office/powerpoint/2010/main" val="181375898"/>
       </p:ext>
     </p:extLst>
   </p:cSld>
@@ -17252,675 +17437,7 @@
 </p:sld>
 </file>
 
-<file path=ppt/slides/slide23.xml><?xml version="1.0" encoding="utf-8"?>
-<p:sld xmlns:a="http://schemas.openxmlformats.org/drawingml/2006/main" xmlns:r="http://schemas.openxmlformats.org/officeDocument/2006/relationships" xmlns:p="http://schemas.openxmlformats.org/presentationml/2006/main">
-  <p:cSld>
-    <p:spTree>
-      <p:nvGrpSpPr>
-        <p:cNvPr id="1" name=""/>
-        <p:cNvGrpSpPr/>
-        <p:nvPr/>
-      </p:nvGrpSpPr>
-      <p:grpSpPr>
-        <a:xfrm>
-          <a:off x="0" y="0"/>
-          <a:ext cx="0" cy="0"/>
-          <a:chOff x="0" y="0"/>
-          <a:chExt cx="0" cy="0"/>
-        </a:xfrm>
-      </p:grpSpPr>
-      <p:sp>
-        <p:nvSpPr>
-          <p:cNvPr id="2" name="Title 1"/>
-          <p:cNvSpPr>
-            <a:spLocks noGrp="1"/>
-          </p:cNvSpPr>
-          <p:nvPr>
-            <p:ph type="title"/>
-          </p:nvPr>
-        </p:nvSpPr>
-        <p:spPr>
-          <a:xfrm>
-            <a:off x="381000" y="230189"/>
-            <a:ext cx="8382000" cy="836612"/>
-          </a:xfrm>
-        </p:spPr>
-        <p:txBody>
-          <a:bodyPr>
-            <a:normAutofit fontScale="90000"/>
-          </a:bodyPr>
-          <a:lstStyle/>
-          <a:p>
-            <a:r>
-              <a:rPr lang="en-US" dirty="0" smtClean="0"/>
-              <a:t>Credits</a:t>
-            </a:r>
-            <a:br>
-              <a:rPr lang="en-US" dirty="0" smtClean="0"/>
-            </a:br>
-            <a:endParaRPr lang="en-US" dirty="0">
-              <a:solidFill>
-                <a:schemeClr val="tx2"/>
-              </a:solidFill>
-            </a:endParaRPr>
-          </a:p>
-        </p:txBody>
-      </p:sp>
-      <p:sp>
-        <p:nvSpPr>
-          <p:cNvPr id="3" name="Text Placeholder 2"/>
-          <p:cNvSpPr>
-            <a:spLocks noGrp="1"/>
-          </p:cNvSpPr>
-          <p:nvPr>
-            <p:ph type="body" sz="quarter" idx="10"/>
-          </p:nvPr>
-        </p:nvSpPr>
-        <p:spPr>
-          <a:xfrm>
-            <a:off x="381000" y="1295400"/>
-            <a:ext cx="8382000" cy="5029200"/>
-          </a:xfrm>
-        </p:spPr>
-        <p:txBody>
-          <a:bodyPr>
-            <a:normAutofit/>
-          </a:bodyPr>
-          <a:lstStyle/>
-          <a:p>
-            <a:endParaRPr lang="en-US" dirty="0" smtClean="0"/>
-          </a:p>
-          <a:p>
-            <a:r>
-              <a:rPr lang="en-US" dirty="0"/>
-              <a:t>"Knot with </a:t>
-            </a:r>
-            <a:r>
-              <a:rPr lang="en-US" dirty="0" err="1"/>
-              <a:t>borromean</a:t>
-            </a:r>
-            <a:r>
-              <a:rPr lang="en-US" dirty="0"/>
-              <a:t> rings in </a:t>
-            </a:r>
-            <a:r>
-              <a:rPr lang="en-US" dirty="0" err="1"/>
-              <a:t>jsj</a:t>
-            </a:r>
-            <a:r>
-              <a:rPr lang="en-US" dirty="0"/>
-              <a:t> </a:t>
-            </a:r>
-            <a:r>
-              <a:rPr lang="en-US" dirty="0" err="1"/>
-              <a:t>decomp</a:t>
-            </a:r>
-            <a:r>
-              <a:rPr lang="en-US" dirty="0"/>
-              <a:t> small". Licensed under CC BY-SA 3.0 via Wikipedia - </a:t>
-            </a:r>
-            <a:r>
-              <a:rPr lang="en-US" dirty="0">
-                <a:hlinkClick r:id="rId3"/>
-              </a:rPr>
-              <a:t>https://en.wikipedia.org/wiki/File:Knot_with_borromean_rings_in_jsj_decomp_small.png#/media/</a:t>
-            </a:r>
-            <a:r>
-              <a:rPr lang="en-US" dirty="0" smtClean="0">
-                <a:hlinkClick r:id="rId3"/>
-              </a:rPr>
-              <a:t>File:Knot_with_borromean_rings_in_jsj_decomp_small.png</a:t>
-            </a:r>
-            <a:endParaRPr lang="en-US" dirty="0" smtClean="0"/>
-          </a:p>
-          <a:p>
-            <a:r>
-              <a:rPr lang="en-US" dirty="0" smtClean="0"/>
-              <a:t>The Mesa team at George Mason has contributed code to this project.</a:t>
-            </a:r>
-          </a:p>
-          <a:p>
-            <a:endParaRPr lang="en-US" dirty="0" smtClean="0"/>
-          </a:p>
-        </p:txBody>
-      </p:sp>
-    </p:spTree>
-    <p:extLst>
-      <p:ext uri="{BB962C8B-B14F-4D97-AF65-F5344CB8AC3E}">
-        <p14:creationId xmlns:p14="http://schemas.microsoft.com/office/powerpoint/2010/main" val="69031901"/>
-      </p:ext>
-    </p:extLst>
-  </p:cSld>
-  <p:clrMapOvr>
-    <a:masterClrMapping/>
-  </p:clrMapOvr>
-  <p:transition xmlns:p14="http://schemas.microsoft.com/office/powerpoint/2010/main">
-    <p:fade/>
-  </p:transition>
-  <p:timing>
-    <p:tnLst>
-      <p:par>
-        <p:cTn xmlns:p14="http://schemas.microsoft.com/office/powerpoint/2010/main" id="1" dur="indefinite" restart="never" nodeType="tmRoot"/>
-      </p:par>
-    </p:tnLst>
-  </p:timing>
-</p:sld>
-</file>
-
-<file path=ppt/slides/slide24.xml><?xml version="1.0" encoding="utf-8"?>
-<p:sld xmlns:a="http://schemas.openxmlformats.org/drawingml/2006/main" xmlns:r="http://schemas.openxmlformats.org/officeDocument/2006/relationships" xmlns:p="http://schemas.openxmlformats.org/presentationml/2006/main">
-  <p:cSld>
-    <p:spTree>
-      <p:nvGrpSpPr>
-        <p:cNvPr id="1" name=""/>
-        <p:cNvGrpSpPr/>
-        <p:nvPr/>
-      </p:nvGrpSpPr>
-      <p:grpSpPr>
-        <a:xfrm>
-          <a:off x="0" y="0"/>
-          <a:ext cx="0" cy="0"/>
-          <a:chOff x="0" y="0"/>
-          <a:chExt cx="0" cy="0"/>
-        </a:xfrm>
-      </p:grpSpPr>
-      <p:sp>
-        <p:nvSpPr>
-          <p:cNvPr id="2" name="Title 1"/>
-          <p:cNvSpPr>
-            <a:spLocks noGrp="1"/>
-          </p:cNvSpPr>
-          <p:nvPr>
-            <p:ph type="title"/>
-          </p:nvPr>
-        </p:nvSpPr>
-        <p:spPr/>
-        <p:txBody>
-          <a:bodyPr/>
-          <a:lstStyle/>
-          <a:p>
-            <a:r>
-              <a:rPr lang="en-US" dirty="0" smtClean="0"/>
-              <a:t>PowerPoint Guidelines</a:t>
-            </a:r>
-            <a:endParaRPr lang="en-US" dirty="0"/>
-          </a:p>
-        </p:txBody>
-      </p:sp>
-      <p:sp>
-        <p:nvSpPr>
-          <p:cNvPr id="3" name="Text Placeholder 2"/>
-          <p:cNvSpPr>
-            <a:spLocks noGrp="1"/>
-          </p:cNvSpPr>
-          <p:nvPr>
-            <p:ph type="body" sz="quarter" idx="10"/>
-          </p:nvPr>
-        </p:nvSpPr>
-        <p:spPr>
-          <a:xfrm>
-            <a:off x="381000" y="1411552"/>
-            <a:ext cx="8382000" cy="2627048"/>
-          </a:xfrm>
-        </p:spPr>
-        <p:txBody>
-          <a:bodyPr/>
-          <a:lstStyle/>
-          <a:p>
-            <a:r>
-              <a:rPr lang="en-US" dirty="0" smtClean="0"/>
-              <a:t>Font, size, and color for text have been formatted for you in the Slide Master</a:t>
-            </a:r>
-          </a:p>
-          <a:p>
-            <a:r>
-              <a:rPr lang="en-US" dirty="0" smtClean="0"/>
-              <a:t>Use the color palette shown below</a:t>
-            </a:r>
-          </a:p>
-          <a:p>
-            <a:r>
-              <a:rPr lang="en-US" dirty="0" smtClean="0"/>
-              <a:t>See next slide for additional guidelines</a:t>
-            </a:r>
-          </a:p>
-          <a:p>
-            <a:r>
-              <a:rPr lang="en-US" dirty="0" smtClean="0"/>
-              <a:t>Hyperlink color: </a:t>
-            </a:r>
-            <a:r>
-              <a:rPr lang="en-US" dirty="0" smtClean="0">
-                <a:hlinkClick r:id="rId3"/>
-              </a:rPr>
-              <a:t>www.microsoft.com</a:t>
-            </a:r>
-            <a:r>
-              <a:rPr lang="en-US" dirty="0" smtClean="0"/>
-              <a:t> </a:t>
-            </a:r>
-          </a:p>
-        </p:txBody>
-      </p:sp>
-      <p:sp>
-        <p:nvSpPr>
-          <p:cNvPr id="4" name="Rounded Rectangle 3"/>
-          <p:cNvSpPr/>
-          <p:nvPr/>
-        </p:nvSpPr>
-        <p:spPr bwMode="auto">
-          <a:xfrm>
-            <a:off x="6216952" y="4381500"/>
-            <a:ext cx="2201333" cy="882953"/>
-          </a:xfrm>
-          <a:prstGeom prst="roundRect">
-            <a:avLst>
-              <a:gd name="adj" fmla="val 9033"/>
-            </a:avLst>
-          </a:prstGeom>
-          <a:ln>
-            <a:headEnd type="none" w="med" len="med"/>
-            <a:tailEnd type="none" w="med" len="med"/>
-          </a:ln>
-        </p:spPr>
-        <p:style>
-          <a:lnRef idx="0">
-            <a:schemeClr val="accent3"/>
-          </a:lnRef>
-          <a:fillRef idx="3">
-            <a:schemeClr val="accent3"/>
-          </a:fillRef>
-          <a:effectRef idx="3">
-            <a:schemeClr val="accent3"/>
-          </a:effectRef>
-          <a:fontRef idx="minor">
-            <a:schemeClr val="lt1"/>
-          </a:fontRef>
-        </p:style>
-        <p:txBody>
-          <a:bodyPr vert="horz" wrap="square" lIns="91436" tIns="45718" rIns="91436" bIns="45718" numCol="1" rtlCol="0" anchor="ctr" anchorCtr="0" compatLnSpc="1">
-            <a:prstTxWarp prst="textNoShape">
-              <a:avLst/>
-            </a:prstTxWarp>
-          </a:bodyPr>
-          <a:lstStyle/>
-          <a:p>
-            <a:pPr algn="ctr" defTabSz="914099" fontAlgn="base">
-              <a:spcBef>
-                <a:spcPct val="0"/>
-              </a:spcBef>
-              <a:spcAft>
-                <a:spcPct val="0"/>
-              </a:spcAft>
-            </a:pPr>
-            <a:r>
-              <a:rPr lang="en-US" sz="2300" dirty="0" smtClean="0">
-                <a:solidFill>
-                  <a:srgbClr val="FFFFFF"/>
-                </a:solidFill>
-                <a:effectLst>
-                  <a:outerShdw blurRad="38100" dist="38100" dir="2700000" algn="tl">
-                    <a:srgbClr val="000000">
-                      <a:alpha val="43137"/>
-                    </a:srgbClr>
-                  </a:outerShdw>
-                </a:effectLst>
-              </a:rPr>
-              <a:t>Sample Fill</a:t>
-            </a:r>
-          </a:p>
-        </p:txBody>
-      </p:sp>
-      <p:sp>
-        <p:nvSpPr>
-          <p:cNvPr id="5" name="Rounded Rectangle 4"/>
-          <p:cNvSpPr/>
-          <p:nvPr/>
-        </p:nvSpPr>
-        <p:spPr bwMode="auto">
-          <a:xfrm>
-            <a:off x="3556000" y="4381500"/>
-            <a:ext cx="2201333" cy="882953"/>
-          </a:xfrm>
-          <a:prstGeom prst="roundRect">
-            <a:avLst>
-              <a:gd name="adj" fmla="val 9033"/>
-            </a:avLst>
-          </a:prstGeom>
-          <a:ln>
-            <a:headEnd type="none" w="med" len="med"/>
-            <a:tailEnd type="none" w="med" len="med"/>
-          </a:ln>
-        </p:spPr>
-        <p:style>
-          <a:lnRef idx="0">
-            <a:schemeClr val="accent2"/>
-          </a:lnRef>
-          <a:fillRef idx="3">
-            <a:schemeClr val="accent2"/>
-          </a:fillRef>
-          <a:effectRef idx="3">
-            <a:schemeClr val="accent2"/>
-          </a:effectRef>
-          <a:fontRef idx="minor">
-            <a:schemeClr val="lt1"/>
-          </a:fontRef>
-        </p:style>
-        <p:txBody>
-          <a:bodyPr vert="horz" wrap="square" lIns="91436" tIns="45718" rIns="91436" bIns="45718" numCol="1" rtlCol="0" anchor="ctr" anchorCtr="0" compatLnSpc="1">
-            <a:prstTxWarp prst="textNoShape">
-              <a:avLst/>
-            </a:prstTxWarp>
-          </a:bodyPr>
-          <a:lstStyle/>
-          <a:p>
-            <a:pPr algn="ctr" defTabSz="914099" fontAlgn="base">
-              <a:spcBef>
-                <a:spcPct val="0"/>
-              </a:spcBef>
-              <a:spcAft>
-                <a:spcPct val="0"/>
-              </a:spcAft>
-            </a:pPr>
-            <a:r>
-              <a:rPr lang="en-US" sz="2300" dirty="0" smtClean="0">
-                <a:solidFill>
-                  <a:srgbClr val="FFFFFF"/>
-                </a:solidFill>
-                <a:effectLst>
-                  <a:outerShdw blurRad="38100" dist="38100" dir="2700000" algn="tl">
-                    <a:srgbClr val="000000">
-                      <a:alpha val="43137"/>
-                    </a:srgbClr>
-                  </a:outerShdw>
-                </a:effectLst>
-              </a:rPr>
-              <a:t>Sample Fill</a:t>
-            </a:r>
-          </a:p>
-        </p:txBody>
-      </p:sp>
-      <p:sp>
-        <p:nvSpPr>
-          <p:cNvPr id="6" name="Rounded Rectangle 5"/>
-          <p:cNvSpPr/>
-          <p:nvPr/>
-        </p:nvSpPr>
-        <p:spPr bwMode="auto">
-          <a:xfrm>
-            <a:off x="825500" y="4381500"/>
-            <a:ext cx="2201333" cy="882953"/>
-          </a:xfrm>
-          <a:prstGeom prst="roundRect">
-            <a:avLst>
-              <a:gd name="adj" fmla="val 9033"/>
-            </a:avLst>
-          </a:prstGeom>
-          <a:ln>
-            <a:headEnd type="none" w="med" len="med"/>
-            <a:tailEnd type="none" w="med" len="med"/>
-          </a:ln>
-        </p:spPr>
-        <p:style>
-          <a:lnRef idx="0">
-            <a:schemeClr val="accent1"/>
-          </a:lnRef>
-          <a:fillRef idx="3">
-            <a:schemeClr val="accent1"/>
-          </a:fillRef>
-          <a:effectRef idx="3">
-            <a:schemeClr val="accent1"/>
-          </a:effectRef>
-          <a:fontRef idx="minor">
-            <a:schemeClr val="lt1"/>
-          </a:fontRef>
-        </p:style>
-        <p:txBody>
-          <a:bodyPr vert="horz" wrap="square" lIns="91436" tIns="45718" rIns="91436" bIns="45718" numCol="1" rtlCol="0" anchor="ctr" anchorCtr="0" compatLnSpc="1">
-            <a:prstTxWarp prst="textNoShape">
-              <a:avLst/>
-            </a:prstTxWarp>
-          </a:bodyPr>
-          <a:lstStyle/>
-          <a:p>
-            <a:pPr algn="ctr" defTabSz="914099"/>
-            <a:r>
-              <a:rPr lang="en-US" sz="2300" dirty="0" smtClean="0">
-                <a:solidFill>
-                  <a:srgbClr val="FFFFFF"/>
-                </a:solidFill>
-                <a:effectLst>
-                  <a:outerShdw blurRad="38100" dist="38100" dir="2700000" algn="tl">
-                    <a:srgbClr val="000000">
-                      <a:alpha val="43137"/>
-                    </a:srgbClr>
-                  </a:outerShdw>
-                </a:effectLst>
-              </a:rPr>
-              <a:t>Sample Fill</a:t>
-            </a:r>
-          </a:p>
-        </p:txBody>
-      </p:sp>
-      <p:sp>
-        <p:nvSpPr>
-          <p:cNvPr id="7" name="Rounded Rectangle 6"/>
-          <p:cNvSpPr/>
-          <p:nvPr/>
-        </p:nvSpPr>
-        <p:spPr bwMode="auto">
-          <a:xfrm>
-            <a:off x="6216952" y="5539619"/>
-            <a:ext cx="2201333" cy="882953"/>
-          </a:xfrm>
-          <a:prstGeom prst="roundRect">
-            <a:avLst>
-              <a:gd name="adj" fmla="val 9033"/>
-            </a:avLst>
-          </a:prstGeom>
-          <a:ln>
-            <a:headEnd type="none" w="med" len="med"/>
-            <a:tailEnd type="none" w="med" len="med"/>
-          </a:ln>
-        </p:spPr>
-        <p:style>
-          <a:lnRef idx="0">
-            <a:schemeClr val="accent6"/>
-          </a:lnRef>
-          <a:fillRef idx="3">
-            <a:schemeClr val="accent6"/>
-          </a:fillRef>
-          <a:effectRef idx="3">
-            <a:schemeClr val="accent6"/>
-          </a:effectRef>
-          <a:fontRef idx="minor">
-            <a:schemeClr val="lt1"/>
-          </a:fontRef>
-        </p:style>
-        <p:txBody>
-          <a:bodyPr vert="horz" wrap="square" lIns="91436" tIns="45718" rIns="91436" bIns="45718" numCol="1" rtlCol="0" anchor="ctr" anchorCtr="0" compatLnSpc="1">
-            <a:prstTxWarp prst="textNoShape">
-              <a:avLst/>
-            </a:prstTxWarp>
-          </a:bodyPr>
-          <a:lstStyle/>
-          <a:p>
-            <a:pPr algn="ctr" defTabSz="914099" fontAlgn="base">
-              <a:spcBef>
-                <a:spcPct val="0"/>
-              </a:spcBef>
-              <a:spcAft>
-                <a:spcPct val="0"/>
-              </a:spcAft>
-            </a:pPr>
-            <a:r>
-              <a:rPr lang="en-US" sz="2300" dirty="0" smtClean="0">
-                <a:solidFill>
-                  <a:srgbClr val="FFFFFF"/>
-                </a:solidFill>
-                <a:effectLst>
-                  <a:outerShdw blurRad="38100" dist="38100" dir="2700000" algn="tl">
-                    <a:srgbClr val="000000">
-                      <a:alpha val="43137"/>
-                    </a:srgbClr>
-                  </a:outerShdw>
-                </a:effectLst>
-              </a:rPr>
-              <a:t>Sample Fill</a:t>
-            </a:r>
-          </a:p>
-        </p:txBody>
-      </p:sp>
-      <p:sp>
-        <p:nvSpPr>
-          <p:cNvPr id="8" name="Rounded Rectangle 7"/>
-          <p:cNvSpPr/>
-          <p:nvPr/>
-        </p:nvSpPr>
-        <p:spPr bwMode="auto">
-          <a:xfrm>
-            <a:off x="3556000" y="5539619"/>
-            <a:ext cx="2201333" cy="882953"/>
-          </a:xfrm>
-          <a:prstGeom prst="roundRect">
-            <a:avLst>
-              <a:gd name="adj" fmla="val 9033"/>
-            </a:avLst>
-          </a:prstGeom>
-          <a:ln>
-            <a:headEnd type="none" w="med" len="med"/>
-            <a:tailEnd type="none" w="med" len="med"/>
-          </a:ln>
-        </p:spPr>
-        <p:style>
-          <a:lnRef idx="0">
-            <a:schemeClr val="accent5"/>
-          </a:lnRef>
-          <a:fillRef idx="3">
-            <a:schemeClr val="accent5"/>
-          </a:fillRef>
-          <a:effectRef idx="3">
-            <a:schemeClr val="accent5"/>
-          </a:effectRef>
-          <a:fontRef idx="minor">
-            <a:schemeClr val="lt1"/>
-          </a:fontRef>
-        </p:style>
-        <p:txBody>
-          <a:bodyPr vert="horz" wrap="square" lIns="91436" tIns="45718" rIns="91436" bIns="45718" numCol="1" rtlCol="0" anchor="ctr" anchorCtr="0" compatLnSpc="1">
-            <a:prstTxWarp prst="textNoShape">
-              <a:avLst/>
-            </a:prstTxWarp>
-          </a:bodyPr>
-          <a:lstStyle/>
-          <a:p>
-            <a:pPr algn="ctr" defTabSz="914099" fontAlgn="base">
-              <a:spcBef>
-                <a:spcPct val="0"/>
-              </a:spcBef>
-              <a:spcAft>
-                <a:spcPct val="0"/>
-              </a:spcAft>
-            </a:pPr>
-            <a:r>
-              <a:rPr lang="en-US" sz="2300" dirty="0" smtClean="0">
-                <a:solidFill>
-                  <a:srgbClr val="FFFFFF"/>
-                </a:solidFill>
-                <a:effectLst>
-                  <a:outerShdw blurRad="38100" dist="38100" dir="2700000" algn="tl">
-                    <a:srgbClr val="000000">
-                      <a:alpha val="43137"/>
-                    </a:srgbClr>
-                  </a:outerShdw>
-                </a:effectLst>
-              </a:rPr>
-              <a:t>Sample Fill</a:t>
-            </a:r>
-          </a:p>
-        </p:txBody>
-      </p:sp>
-      <p:sp>
-        <p:nvSpPr>
-          <p:cNvPr id="9" name="Rounded Rectangle 8"/>
-          <p:cNvSpPr/>
-          <p:nvPr/>
-        </p:nvSpPr>
-        <p:spPr bwMode="auto">
-          <a:xfrm>
-            <a:off x="825500" y="5539619"/>
-            <a:ext cx="2201333" cy="882953"/>
-          </a:xfrm>
-          <a:prstGeom prst="roundRect">
-            <a:avLst>
-              <a:gd name="adj" fmla="val 9033"/>
-            </a:avLst>
-          </a:prstGeom>
-          <a:ln>
-            <a:headEnd type="none" w="med" len="med"/>
-            <a:tailEnd type="none" w="med" len="med"/>
-          </a:ln>
-        </p:spPr>
-        <p:style>
-          <a:lnRef idx="0">
-            <a:schemeClr val="accent4"/>
-          </a:lnRef>
-          <a:fillRef idx="3">
-            <a:schemeClr val="accent4"/>
-          </a:fillRef>
-          <a:effectRef idx="3">
-            <a:schemeClr val="accent4"/>
-          </a:effectRef>
-          <a:fontRef idx="minor">
-            <a:schemeClr val="lt1"/>
-          </a:fontRef>
-        </p:style>
-        <p:txBody>
-          <a:bodyPr vert="horz" wrap="square" lIns="91436" tIns="45718" rIns="91436" bIns="45718" numCol="1" rtlCol="0" anchor="ctr" anchorCtr="0" compatLnSpc="1">
-            <a:prstTxWarp prst="textNoShape">
-              <a:avLst/>
-            </a:prstTxWarp>
-          </a:bodyPr>
-          <a:lstStyle/>
-          <a:p>
-            <a:pPr algn="ctr" defTabSz="914099"/>
-            <a:r>
-              <a:rPr lang="en-US" sz="2300" dirty="0" smtClean="0">
-                <a:solidFill>
-                  <a:srgbClr val="FFFFFF"/>
-                </a:solidFill>
-                <a:effectLst>
-                  <a:outerShdw blurRad="38100" dist="38100" dir="2700000" algn="tl">
-                    <a:srgbClr val="000000">
-                      <a:alpha val="43137"/>
-                    </a:srgbClr>
-                  </a:outerShdw>
-                </a:effectLst>
-              </a:rPr>
-              <a:t>Sample Fill</a:t>
-            </a:r>
-          </a:p>
-        </p:txBody>
-      </p:sp>
-    </p:spTree>
-  </p:cSld>
-  <p:clrMapOvr>
-    <a:masterClrMapping/>
-  </p:clrMapOvr>
-  <p:transition xmlns:p14="http://schemas.microsoft.com/office/powerpoint/2010/main">
-    <p:fade/>
-  </p:transition>
-  <p:timing>
-    <p:tnLst>
-      <p:par>
-        <p:cTn xmlns:p14="http://schemas.microsoft.com/office/powerpoint/2010/main" id="1" dur="indefinite" restart="never" nodeType="tmRoot"/>
-      </p:par>
-    </p:tnLst>
-  </p:timing>
-</p:sld>
-</file>
-
-<file path=ppt/slides/slide3.xml><?xml version="1.0" encoding="utf-8"?>
+<file path=ppt/slides/slide4.xml><?xml version="1.0" encoding="utf-8"?>
 <p:sld xmlns:a="http://schemas.openxmlformats.org/drawingml/2006/main" xmlns:r="http://schemas.openxmlformats.org/officeDocument/2006/relationships" xmlns:p="http://schemas.openxmlformats.org/presentationml/2006/main">
   <p:cSld>
     <p:spTree>
@@ -18096,7 +17613,7 @@
 </p:sld>
 </file>
 
-<file path=ppt/slides/slide4.xml><?xml version="1.0" encoding="utf-8"?>
+<file path=ppt/slides/slide5.xml><?xml version="1.0" encoding="utf-8"?>
 <p:sld xmlns:a="http://schemas.openxmlformats.org/drawingml/2006/main" xmlns:r="http://schemas.openxmlformats.org/officeDocument/2006/relationships" xmlns:p="http://schemas.openxmlformats.org/presentationml/2006/main">
   <p:cSld>
     <p:spTree>
@@ -18182,7 +17699,15 @@
           <a:p>
             <a:r>
               <a:rPr lang="en-US" dirty="0" smtClean="0"/>
-              <a:t>So if we are writing a summation function, we should ask, “Can we write this to handle summing not just familiar numbers, but also clock numbers, knots,  vectors, etc.?”</a:t>
+              <a:t>So if we are </a:t>
+            </a:r>
+            <a:r>
+              <a:rPr lang="en-US" dirty="0" smtClean="0"/>
+              <a:t>writing, e.g., </a:t>
+            </a:r>
+            <a:r>
+              <a:rPr lang="en-US" dirty="0" smtClean="0"/>
+              <a:t>a summation function, we should ask, “Can we write this to handle summing not just familiar numbers, but also clock numbers, knots,  vectors, etc.?”</a:t>
             </a:r>
           </a:p>
           <a:p>
@@ -18219,148 +17744,6 @@
     <p:extLst>
       <p:ext uri="{BB962C8B-B14F-4D97-AF65-F5344CB8AC3E}">
         <p14:creationId xmlns:p14="http://schemas.microsoft.com/office/powerpoint/2010/main" val="5845622"/>
-      </p:ext>
-    </p:extLst>
-  </p:cSld>
-  <p:clrMapOvr>
-    <a:masterClrMapping/>
-  </p:clrMapOvr>
-  <p:transition xmlns:p14="http://schemas.microsoft.com/office/powerpoint/2010/main">
-    <p:fade/>
-  </p:transition>
-  <p:timing>
-    <p:tnLst>
-      <p:par>
-        <p:cTn xmlns:p14="http://schemas.microsoft.com/office/powerpoint/2010/main" id="1" dur="indefinite" restart="never" nodeType="tmRoot"/>
-      </p:par>
-    </p:tnLst>
-  </p:timing>
-</p:sld>
-</file>
-
-<file path=ppt/slides/slide5.xml><?xml version="1.0" encoding="utf-8"?>
-<p:sld xmlns:a="http://schemas.openxmlformats.org/drawingml/2006/main" xmlns:r="http://schemas.openxmlformats.org/officeDocument/2006/relationships" xmlns:p="http://schemas.openxmlformats.org/presentationml/2006/main">
-  <p:cSld>
-    <p:spTree>
-      <p:nvGrpSpPr>
-        <p:cNvPr id="1" name=""/>
-        <p:cNvGrpSpPr/>
-        <p:nvPr/>
-      </p:nvGrpSpPr>
-      <p:grpSpPr>
-        <a:xfrm>
-          <a:off x="0" y="0"/>
-          <a:ext cx="0" cy="0"/>
-          <a:chOff x="0" y="0"/>
-          <a:chExt cx="0" cy="0"/>
-        </a:xfrm>
-      </p:grpSpPr>
-      <p:sp>
-        <p:nvSpPr>
-          <p:cNvPr id="2" name="Title 1"/>
-          <p:cNvSpPr>
-            <a:spLocks noGrp="1"/>
-          </p:cNvSpPr>
-          <p:nvPr>
-            <p:ph type="title"/>
-          </p:nvPr>
-        </p:nvSpPr>
-        <p:spPr>
-          <a:xfrm>
-            <a:off x="381000" y="230188"/>
-            <a:ext cx="8382000" cy="1903412"/>
-          </a:xfrm>
-        </p:spPr>
-        <p:txBody>
-          <a:bodyPr>
-            <a:normAutofit/>
-          </a:bodyPr>
-          <a:lstStyle/>
-          <a:p>
-            <a:r>
-              <a:rPr lang="en-US" dirty="0" smtClean="0"/>
-              <a:t>Agent-Based Modeling</a:t>
-            </a:r>
-            <a:br>
-              <a:rPr lang="en-US" dirty="0" smtClean="0"/>
-            </a:br>
-            <a:r>
-              <a:rPr lang="en-US" sz="3600" dirty="0" smtClean="0">
-                <a:solidFill>
-                  <a:schemeClr val="tx2"/>
-                </a:solidFill>
-              </a:rPr>
-              <a:t>Generating complex macro-behavior from simple rule</a:t>
-            </a:r>
-            <a:endParaRPr lang="en-US" dirty="0">
-              <a:solidFill>
-                <a:schemeClr val="tx2"/>
-              </a:solidFill>
-            </a:endParaRPr>
-          </a:p>
-        </p:txBody>
-      </p:sp>
-      <p:sp>
-        <p:nvSpPr>
-          <p:cNvPr id="3" name="Text Placeholder 2"/>
-          <p:cNvSpPr>
-            <a:spLocks noGrp="1"/>
-          </p:cNvSpPr>
-          <p:nvPr>
-            <p:ph type="body" sz="quarter" idx="10"/>
-          </p:nvPr>
-        </p:nvSpPr>
-        <p:spPr>
-          <a:xfrm>
-            <a:off x="381000" y="2438400"/>
-            <a:ext cx="8382000" cy="3352800"/>
-          </a:xfrm>
-        </p:spPr>
-        <p:txBody>
-          <a:bodyPr>
-            <a:normAutofit/>
-          </a:bodyPr>
-          <a:lstStyle/>
-          <a:p>
-            <a:r>
-              <a:rPr lang="en-US" dirty="0" smtClean="0"/>
-              <a:t>Agents:</a:t>
-            </a:r>
-          </a:p>
-          <a:p>
-            <a:pPr lvl="1"/>
-            <a:r>
-              <a:rPr lang="en-US" dirty="0" smtClean="0"/>
-              <a:t>Exist in some environment</a:t>
-            </a:r>
-          </a:p>
-          <a:p>
-            <a:pPr lvl="1"/>
-            <a:r>
-              <a:rPr lang="en-US" dirty="0" smtClean="0"/>
-              <a:t>Are called upon to act</a:t>
-            </a:r>
-          </a:p>
-          <a:p>
-            <a:pPr lvl="1"/>
-            <a:r>
-              <a:rPr lang="en-US" dirty="0" smtClean="0"/>
-              <a:t>Look to the environment to decide what to do</a:t>
-            </a:r>
-          </a:p>
-          <a:p>
-            <a:pPr lvl="1"/>
-            <a:r>
-              <a:rPr lang="en-US" dirty="0" smtClean="0"/>
-              <a:t>Influence other agents by their actions</a:t>
-            </a:r>
-          </a:p>
-        </p:txBody>
-      </p:sp>
-    </p:spTree>
-    <p:extLst>
-      <p:ext uri="{BB962C8B-B14F-4D97-AF65-F5344CB8AC3E}">
-        <p14:creationId xmlns:p14="http://schemas.microsoft.com/office/powerpoint/2010/main" val="3726126062"/>
       </p:ext>
     </p:extLst>
   </p:cSld>
@@ -18410,12 +17793,12 @@
         <p:spPr>
           <a:xfrm>
             <a:off x="381000" y="230188"/>
-            <a:ext cx="8382000" cy="912812"/>
+            <a:ext cx="8382000" cy="1903412"/>
           </a:xfrm>
         </p:spPr>
         <p:txBody>
           <a:bodyPr>
-            <a:normAutofit fontScale="90000"/>
+            <a:normAutofit/>
           </a:bodyPr>
           <a:lstStyle/>
           <a:p>
@@ -18426,6 +17809,14 @@
             <a:br>
               <a:rPr lang="en-US" dirty="0" smtClean="0"/>
             </a:br>
+            <a:r>
+              <a:rPr lang="en-US" sz="3600" dirty="0" smtClean="0">
+                <a:solidFill>
+                  <a:schemeClr val="tx2"/>
+                </a:solidFill>
+              </a:rPr>
+              <a:t>Generating complex macro-behavior from simple rule</a:t>
+            </a:r>
             <a:endParaRPr lang="en-US" dirty="0">
               <a:solidFill>
                 <a:schemeClr val="tx2"/>
@@ -18446,8 +17837,8 @@
         </p:nvSpPr>
         <p:spPr>
           <a:xfrm>
-            <a:off x="381000" y="990600"/>
-            <a:ext cx="8382000" cy="2209800"/>
+            <a:off x="381000" y="2438400"/>
+            <a:ext cx="8382000" cy="3352800"/>
           </a:xfrm>
         </p:spPr>
         <p:txBody>
@@ -18458,66 +17849,43 @@
           <a:p>
             <a:r>
               <a:rPr lang="en-US" dirty="0" smtClean="0"/>
-              <a:t>Example: a forest fire model</a:t>
+              <a:t>Agents:</a:t>
             </a:r>
           </a:p>
           <a:p>
             <a:pPr lvl="1"/>
             <a:r>
               <a:rPr lang="en-US" dirty="0" smtClean="0"/>
-              <a:t>Lightening strikes randomly, starting a fire</a:t>
+              <a:t>Exist in some environment</a:t>
             </a:r>
           </a:p>
           <a:p>
             <a:pPr lvl="1"/>
             <a:r>
               <a:rPr lang="en-US" dirty="0" smtClean="0"/>
-              <a:t>Trees on fire ignite neighbors</a:t>
+              <a:t>Are called upon to act</a:t>
             </a:r>
           </a:p>
           <a:p>
             <a:pPr lvl="1"/>
             <a:r>
               <a:rPr lang="en-US" dirty="0" smtClean="0"/>
-              <a:t>Trees grow anew in burned out spots</a:t>
+              <a:t>Look to the environment to decide what to do</a:t>
+            </a:r>
+          </a:p>
+          <a:p>
+            <a:pPr lvl="1"/>
+            <a:r>
+              <a:rPr lang="en-US" dirty="0" smtClean="0"/>
+              <a:t>Influence other agents by their actions</a:t>
             </a:r>
           </a:p>
         </p:txBody>
       </p:sp>
-      <p:pic>
-        <p:nvPicPr>
-          <p:cNvPr id="4" name="Picture 3" descr="forest_fire.png"/>
-          <p:cNvPicPr>
-            <a:picLocks noChangeAspect="1"/>
-          </p:cNvPicPr>
-          <p:nvPr/>
-        </p:nvPicPr>
-        <p:blipFill>
-          <a:blip r:embed="rId3">
-            <a:extLst>
-              <a:ext uri="{28A0092B-C50C-407E-A947-70E740481C1C}">
-                <a14:useLocalDpi xmlns:a14="http://schemas.microsoft.com/office/drawing/2010/main" val="0"/>
-              </a:ext>
-            </a:extLst>
-          </a:blip>
-          <a:stretch>
-            <a:fillRect/>
-          </a:stretch>
-        </p:blipFill>
-        <p:spPr>
-          <a:xfrm>
-            <a:off x="3810000" y="3048000"/>
-            <a:ext cx="4724400" cy="3543300"/>
-          </a:xfrm>
-          <a:prstGeom prst="rect">
-            <a:avLst/>
-          </a:prstGeom>
-        </p:spPr>
-      </p:pic>
     </p:spTree>
     <p:extLst>
       <p:ext uri="{BB962C8B-B14F-4D97-AF65-F5344CB8AC3E}">
-        <p14:creationId xmlns:p14="http://schemas.microsoft.com/office/powerpoint/2010/main" val="4038856037"/>
+        <p14:creationId xmlns:p14="http://schemas.microsoft.com/office/powerpoint/2010/main" val="3726126062"/>
       </p:ext>
     </p:extLst>
   </p:cSld>
@@ -18578,6 +17946,163 @@
           <a:p>
             <a:r>
               <a:rPr lang="en-US" dirty="0" smtClean="0"/>
+              <a:t>Agent-Based Modeling</a:t>
+            </a:r>
+            <a:br>
+              <a:rPr lang="en-US" dirty="0" smtClean="0"/>
+            </a:br>
+            <a:endParaRPr lang="en-US" dirty="0">
+              <a:solidFill>
+                <a:schemeClr val="tx2"/>
+              </a:solidFill>
+            </a:endParaRPr>
+          </a:p>
+        </p:txBody>
+      </p:sp>
+      <p:sp>
+        <p:nvSpPr>
+          <p:cNvPr id="3" name="Text Placeholder 2"/>
+          <p:cNvSpPr>
+            <a:spLocks noGrp="1"/>
+          </p:cNvSpPr>
+          <p:nvPr>
+            <p:ph type="body" sz="quarter" idx="10"/>
+          </p:nvPr>
+        </p:nvSpPr>
+        <p:spPr>
+          <a:xfrm>
+            <a:off x="381000" y="990600"/>
+            <a:ext cx="8382000" cy="2209800"/>
+          </a:xfrm>
+        </p:spPr>
+        <p:txBody>
+          <a:bodyPr>
+            <a:normAutofit/>
+          </a:bodyPr>
+          <a:lstStyle/>
+          <a:p>
+            <a:r>
+              <a:rPr lang="en-US" dirty="0" smtClean="0"/>
+              <a:t>Example: a forest fire model</a:t>
+            </a:r>
+          </a:p>
+          <a:p>
+            <a:pPr lvl="1"/>
+            <a:r>
+              <a:rPr lang="en-US" dirty="0" smtClean="0"/>
+              <a:t>Lightening strikes randomly, starting a fire</a:t>
+            </a:r>
+          </a:p>
+          <a:p>
+            <a:pPr lvl="1"/>
+            <a:r>
+              <a:rPr lang="en-US" dirty="0" smtClean="0"/>
+              <a:t>Trees on fire ignite neighbors</a:t>
+            </a:r>
+          </a:p>
+          <a:p>
+            <a:pPr lvl="1"/>
+            <a:r>
+              <a:rPr lang="en-US" dirty="0" smtClean="0"/>
+              <a:t>Trees grow anew in burned out spots</a:t>
+            </a:r>
+          </a:p>
+        </p:txBody>
+      </p:sp>
+      <p:pic>
+        <p:nvPicPr>
+          <p:cNvPr id="4" name="Picture 3" descr="forest_fire.png"/>
+          <p:cNvPicPr>
+            <a:picLocks noChangeAspect="1"/>
+          </p:cNvPicPr>
+          <p:nvPr/>
+        </p:nvPicPr>
+        <p:blipFill>
+          <a:blip r:embed="rId3">
+            <a:extLst>
+              <a:ext uri="{28A0092B-C50C-407E-A947-70E740481C1C}">
+                <a14:useLocalDpi xmlns:a14="http://schemas.microsoft.com/office/drawing/2010/main" val="0"/>
+              </a:ext>
+            </a:extLst>
+          </a:blip>
+          <a:stretch>
+            <a:fillRect/>
+          </a:stretch>
+        </p:blipFill>
+        <p:spPr>
+          <a:xfrm>
+            <a:off x="3810000" y="3048000"/>
+            <a:ext cx="4724400" cy="3543300"/>
+          </a:xfrm>
+          <a:prstGeom prst="rect">
+            <a:avLst/>
+          </a:prstGeom>
+        </p:spPr>
+      </p:pic>
+    </p:spTree>
+    <p:extLst>
+      <p:ext uri="{BB962C8B-B14F-4D97-AF65-F5344CB8AC3E}">
+        <p14:creationId xmlns:p14="http://schemas.microsoft.com/office/powerpoint/2010/main" val="4038856037"/>
+      </p:ext>
+    </p:extLst>
+  </p:cSld>
+  <p:clrMapOvr>
+    <a:masterClrMapping/>
+  </p:clrMapOvr>
+  <p:transition xmlns:p14="http://schemas.microsoft.com/office/powerpoint/2010/main">
+    <p:fade/>
+  </p:transition>
+  <p:timing>
+    <p:tnLst>
+      <p:par>
+        <p:cTn xmlns:p14="http://schemas.microsoft.com/office/powerpoint/2010/main" id="1" dur="indefinite" restart="never" nodeType="tmRoot"/>
+      </p:par>
+    </p:tnLst>
+  </p:timing>
+</p:sld>
+</file>
+
+<file path=ppt/slides/slide8.xml><?xml version="1.0" encoding="utf-8"?>
+<p:sld xmlns:a="http://schemas.openxmlformats.org/drawingml/2006/main" xmlns:r="http://schemas.openxmlformats.org/officeDocument/2006/relationships" xmlns:p="http://schemas.openxmlformats.org/presentationml/2006/main">
+  <p:cSld>
+    <p:spTree>
+      <p:nvGrpSpPr>
+        <p:cNvPr id="1" name=""/>
+        <p:cNvGrpSpPr/>
+        <p:nvPr/>
+      </p:nvGrpSpPr>
+      <p:grpSpPr>
+        <a:xfrm>
+          <a:off x="0" y="0"/>
+          <a:ext cx="0" cy="0"/>
+          <a:chOff x="0" y="0"/>
+          <a:chExt cx="0" cy="0"/>
+        </a:xfrm>
+      </p:grpSpPr>
+      <p:sp>
+        <p:nvSpPr>
+          <p:cNvPr id="2" name="Title 1"/>
+          <p:cNvSpPr>
+            <a:spLocks noGrp="1"/>
+          </p:cNvSpPr>
+          <p:nvPr>
+            <p:ph type="title"/>
+          </p:nvPr>
+        </p:nvSpPr>
+        <p:spPr>
+          <a:xfrm>
+            <a:off x="381000" y="230188"/>
+            <a:ext cx="8382000" cy="912812"/>
+          </a:xfrm>
+        </p:spPr>
+        <p:txBody>
+          <a:bodyPr>
+            <a:normAutofit fontScale="90000"/>
+          </a:bodyPr>
+          <a:lstStyle/>
+          <a:p>
+            <a:r>
+              <a:rPr lang="en-US" dirty="0" smtClean="0"/>
               <a:t>Agent-Based Modeling (ABM)</a:t>
             </a:r>
             <a:br>
@@ -18687,7 +18212,7 @@
 </p:sld>
 </file>
 
-<file path=ppt/slides/slide8.xml><?xml version="1.0" encoding="utf-8"?>
+<file path=ppt/slides/slide9.xml><?xml version="1.0" encoding="utf-8"?>
 <p:sld xmlns:a="http://schemas.openxmlformats.org/drawingml/2006/main" xmlns:r="http://schemas.openxmlformats.org/officeDocument/2006/relationships" xmlns:p="http://schemas.openxmlformats.org/presentationml/2006/main">
   <p:cSld>
     <p:spTree>
@@ -18762,11 +18287,7 @@
             </a:r>
             <a:r>
               <a:rPr lang="en-US" dirty="0" smtClean="0"/>
-              <a:t> has been to continually to push more and more of the “work” into generic ABM libraries</a:t>
-            </a:r>
-            <a:r>
-              <a:rPr lang="en-US" dirty="0" smtClean="0"/>
-              <a:t>.</a:t>
+              <a:t> has been to continually to push more and more of the “work” into generic ABM libraries.</a:t>
             </a:r>
           </a:p>
         </p:txBody>
@@ -18793,7 +18314,7 @@
           <a:graphicData uri="http://schemas.openxmlformats.org/presentationml/2006/ole">
             <mc:AlternateContent xmlns:mc="http://schemas.openxmlformats.org/markup-compatibility/2006">
               <mc:Choice xmlns:v="urn:schemas-microsoft-com:vml" Requires="v">
-                <p:oleObj spid="_x0000_s1027" name="Document" r:id="rId3" imgW="6540500" imgH="1270000" progId="Word.Document.12">
+                <p:oleObj spid="_x0000_s1041" name="Document" r:id="rId3" imgW="6540500" imgH="1270000" progId="Word.Document.12">
                   <p:embed/>
                 </p:oleObj>
               </mc:Choice>
@@ -18832,143 +18353,6 @@
     <p:extLst>
       <p:ext uri="{BB962C8B-B14F-4D97-AF65-F5344CB8AC3E}">
         <p14:creationId xmlns:p14="http://schemas.microsoft.com/office/powerpoint/2010/main" val="1136954897"/>
-      </p:ext>
-    </p:extLst>
-  </p:cSld>
-  <p:clrMapOvr>
-    <a:masterClrMapping/>
-  </p:clrMapOvr>
-  <p:transition xmlns:p14="http://schemas.microsoft.com/office/powerpoint/2010/main">
-    <p:fade/>
-  </p:transition>
-  <p:timing>
-    <p:tnLst>
-      <p:par>
-        <p:cTn xmlns:p14="http://schemas.microsoft.com/office/powerpoint/2010/main" id="1" dur="indefinite" restart="never" nodeType="tmRoot"/>
-      </p:par>
-    </p:tnLst>
-  </p:timing>
-</p:sld>
-</file>
-
-<file path=ppt/slides/slide9.xml><?xml version="1.0" encoding="utf-8"?>
-<p:sld xmlns:a="http://schemas.openxmlformats.org/drawingml/2006/main" xmlns:r="http://schemas.openxmlformats.org/officeDocument/2006/relationships" xmlns:p="http://schemas.openxmlformats.org/presentationml/2006/main">
-  <p:cSld>
-    <p:spTree>
-      <p:nvGrpSpPr>
-        <p:cNvPr id="1" name=""/>
-        <p:cNvGrpSpPr/>
-        <p:nvPr/>
-      </p:nvGrpSpPr>
-      <p:grpSpPr>
-        <a:xfrm>
-          <a:off x="0" y="0"/>
-          <a:ext cx="0" cy="0"/>
-          <a:chOff x="0" y="0"/>
-          <a:chExt cx="0" cy="0"/>
-        </a:xfrm>
-      </p:grpSpPr>
-      <p:sp>
-        <p:nvSpPr>
-          <p:cNvPr id="2" name="Title 1"/>
-          <p:cNvSpPr>
-            <a:spLocks noGrp="1"/>
-          </p:cNvSpPr>
-          <p:nvPr>
-            <p:ph type="title"/>
-          </p:nvPr>
-        </p:nvSpPr>
-        <p:spPr>
-          <a:xfrm>
-            <a:off x="381000" y="230188"/>
-            <a:ext cx="8382000" cy="677108"/>
-          </a:xfrm>
-        </p:spPr>
-        <p:txBody>
-          <a:bodyPr/>
-          <a:lstStyle/>
-          <a:p>
-            <a:r>
-              <a:rPr lang="en-US" dirty="0" smtClean="0"/>
-              <a:t>ABM and Generic Programming</a:t>
-            </a:r>
-            <a:endParaRPr lang="en-US" dirty="0"/>
-          </a:p>
-        </p:txBody>
-      </p:sp>
-      <p:sp>
-        <p:nvSpPr>
-          <p:cNvPr id="3" name="Text Placeholder 2"/>
-          <p:cNvSpPr>
-            <a:spLocks noGrp="1"/>
-          </p:cNvSpPr>
-          <p:nvPr>
-            <p:ph type="body" sz="quarter" idx="10"/>
-          </p:nvPr>
-        </p:nvSpPr>
-        <p:spPr>
-          <a:xfrm>
-            <a:off x="381000" y="1411552"/>
-            <a:ext cx="8382000" cy="4836848"/>
-          </a:xfrm>
-        </p:spPr>
-        <p:txBody>
-          <a:bodyPr/>
-          <a:lstStyle/>
-          <a:p>
-            <a:r>
-              <a:rPr lang="en-US" dirty="0" smtClean="0"/>
-              <a:t>Space is usually represented as a grid.</a:t>
-            </a:r>
-          </a:p>
-          <a:p>
-            <a:pPr lvl="1"/>
-            <a:r>
-              <a:rPr lang="en-US" dirty="0" smtClean="0"/>
-              <a:t>For finer-grained space, add more cells!</a:t>
-            </a:r>
-          </a:p>
-          <a:p>
-            <a:r>
-              <a:rPr lang="en-US" dirty="0" smtClean="0"/>
-              <a:t>Many models have agents look at a “neighborhood” around their location, often a square.</a:t>
-            </a:r>
-          </a:p>
-          <a:p>
-            <a:pPr lvl="1"/>
-            <a:r>
-              <a:rPr lang="en-US" dirty="0" smtClean="0"/>
-              <a:t>Special methods are written to deal with this neighborhood.</a:t>
-            </a:r>
-          </a:p>
-          <a:p>
-            <a:r>
-              <a:rPr lang="en-US" dirty="0" smtClean="0"/>
-              <a:t>A powerful abstraction is the “grid view.” This can be </a:t>
-            </a:r>
-            <a:r>
-              <a:rPr lang="en-US" i="1" dirty="0" smtClean="0"/>
-              <a:t>any</a:t>
-            </a:r>
-            <a:r>
-              <a:rPr lang="en-US" dirty="0" smtClean="0"/>
-              <a:t> collection of cells around an agent.</a:t>
-            </a:r>
-          </a:p>
-          <a:p>
-            <a:pPr lvl="1"/>
-            <a:r>
-              <a:rPr lang="en-US" dirty="0" smtClean="0"/>
-              <a:t>All grid methods work on grid views.</a:t>
-            </a:r>
-            <a:endParaRPr lang="en-US" dirty="0"/>
-          </a:p>
-        </p:txBody>
-      </p:sp>
-    </p:spTree>
-    <p:extLst>
-      <p:ext uri="{BB962C8B-B14F-4D97-AF65-F5344CB8AC3E}">
-        <p14:creationId xmlns:p14="http://schemas.microsoft.com/office/powerpoint/2010/main" val="2985670801"/>
       </p:ext>
     </p:extLst>
   </p:cSld>

</xml_diff>